<commit_message>
Added 3D textiles and resources
</commit_message>
<xml_diff>
--- a/ICMAC TexGen workshop 2018.pptx
+++ b/ICMAC TexGen workshop 2018.pptx
@@ -5,10 +5,10 @@
     <p:sldMasterId id="2147483648" r:id="rId1"/>
   </p:sldMasterIdLst>
   <p:notesMasterIdLst>
-    <p:notesMasterId r:id="rId20"/>
+    <p:notesMasterId r:id="rId23"/>
   </p:notesMasterIdLst>
   <p:handoutMasterIdLst>
-    <p:handoutMasterId r:id="rId21"/>
+    <p:handoutMasterId r:id="rId24"/>
   </p:handoutMasterIdLst>
   <p:sldIdLst>
     <p:sldId id="289" r:id="rId2"/>
@@ -29,6 +29,9 @@
     <p:sldId id="316" r:id="rId17"/>
     <p:sldId id="317" r:id="rId18"/>
     <p:sldId id="318" r:id="rId19"/>
+    <p:sldId id="319" r:id="rId20"/>
+    <p:sldId id="320" r:id="rId21"/>
+    <p:sldId id="321" r:id="rId22"/>
   </p:sldIdLst>
   <p:sldSz cx="9144000" cy="6858000" type="screen4x3"/>
   <p:notesSz cx="6858000" cy="9144000"/>
@@ -150,6 +153,9 @@
             <p14:sldId id="316"/>
             <p14:sldId id="317"/>
             <p14:sldId id="318"/>
+            <p14:sldId id="319"/>
+            <p14:sldId id="320"/>
+            <p14:sldId id="321"/>
           </p14:sldIdLst>
         </p14:section>
       </p14:sectionLst>
@@ -261,7 +267,7 @@
           <a:p>
             <a:fld id="{B08732D1-0119-4424-ADB1-6A88624C9257}" type="datetimeFigureOut">
               <a:rPr lang="en-GB" smtClean="0"/>
-              <a:t>26/06/2018</a:t>
+              <a:t>28/06/2018</a:t>
             </a:fld>
             <a:endParaRPr lang="en-GB"/>
           </a:p>
@@ -426,7 +432,7 @@
           <a:p>
             <a:fld id="{E3654FE6-3F31-4904-9137-AFF662B7D702}" type="datetimeFigureOut">
               <a:rPr lang="en-GB" smtClean="0"/>
-              <a:t>26/06/2018</a:t>
+              <a:t>28/06/2018</a:t>
             </a:fld>
             <a:endParaRPr lang="en-GB"/>
           </a:p>
@@ -2861,7 +2867,7 @@
           <a:p>
             <a:fld id="{114E112F-1B58-4F80-8548-230F871317D2}" type="datetimeFigureOut">
               <a:rPr lang="en-GB" smtClean="0"/>
-              <a:t>26/06/2018</a:t>
+              <a:t>28/06/2018</a:t>
             </a:fld>
             <a:endParaRPr lang="en-GB"/>
           </a:p>
@@ -3417,6 +3423,13 @@
       </p:transition>
     </mc:Fallback>
   </mc:AlternateContent>
+  <p:timing>
+    <p:tnLst>
+      <p:par>
+        <p:cTn id="1" dur="indefinite" restart="never" nodeType="tmRoot"/>
+      </p:par>
+    </p:tnLst>
+  </p:timing>
 </p:sld>
 </file>
 
@@ -4951,6 +4964,13 @@
       </p:transition>
     </mc:Fallback>
   </mc:AlternateContent>
+  <p:timing>
+    <p:tnLst>
+      <p:par>
+        <p:cTn id="1" dur="indefinite" restart="never" nodeType="tmRoot"/>
+      </p:par>
+    </p:tnLst>
+  </p:timing>
 </p:sld>
 </file>
 
@@ -5063,9 +5083,6 @@
               </a:rPr>
               <a:t> as a base class. They are used to input weave pattern information which then automatically generate the yarns. </a:t>
             </a:r>
-            <a:endParaRPr lang="en-GB" sz="2400" dirty="0" smtClean="0">
-              <a:latin typeface="Calibri" panose="020F0502020204030204" pitchFamily="34" charset="0"/>
-            </a:endParaRPr>
           </a:p>
         </p:txBody>
       </p:sp>
@@ -5091,6 +5108,13 @@
       </p:transition>
     </mc:Fallback>
   </mc:AlternateContent>
+  <p:timing>
+    <p:tnLst>
+      <p:par>
+        <p:cTn id="1" dur="indefinite" restart="never" nodeType="tmRoot"/>
+      </p:par>
+    </p:tnLst>
+  </p:timing>
 </p:sld>
 </file>
 
@@ -5174,9 +5198,6 @@
               </a:rPr>
               <a:t> GUI creates weaves using the CTextileWeave2D class</a:t>
             </a:r>
-            <a:endParaRPr lang="en-GB" sz="2400" dirty="0" smtClean="0">
-              <a:latin typeface="Calibri" panose="020F0502020204030204" pitchFamily="34" charset="0"/>
-            </a:endParaRPr>
           </a:p>
         </p:txBody>
       </p:sp>
@@ -5814,9 +5835,6 @@
               </a:rPr>
               <a:t> position</a:t>
             </a:r>
-            <a:endParaRPr lang="en-GB" sz="2000" dirty="0" smtClean="0">
-              <a:latin typeface="+mj-lt"/>
-            </a:endParaRPr>
           </a:p>
         </p:txBody>
       </p:sp>
@@ -5848,9 +5866,6 @@
               </a:rPr>
               <a:t>x, y position</a:t>
             </a:r>
-            <a:endParaRPr lang="en-GB" sz="2000" dirty="0" smtClean="0">
-              <a:latin typeface="+mj-lt"/>
-            </a:endParaRPr>
           </a:p>
         </p:txBody>
       </p:sp>
@@ -5923,9 +5938,6 @@
               </a:rPr>
               <a:t>(Weft down, warp up)</a:t>
             </a:r>
-            <a:endParaRPr lang="en-GB" sz="2000" dirty="0" smtClean="0">
-              <a:latin typeface="+mj-lt"/>
-            </a:endParaRPr>
           </a:p>
         </p:txBody>
       </p:sp>
@@ -6282,9 +6294,6 @@
               </a:rPr>
               <a:t>http://texgen.sourceforge.net/index.php/Extraction_of_Material_Properties_using_Voxel_Meshing_and_Abaqus</a:t>
             </a:r>
-            <a:endParaRPr lang="en-GB" sz="2000" dirty="0">
-              <a:latin typeface="Calibri" panose="020F0502020204030204" pitchFamily="34" charset="0"/>
-            </a:endParaRPr>
           </a:p>
         </p:txBody>
       </p:sp>
@@ -6911,7 +6920,7 @@
         </p:blipFill>
         <p:spPr>
           <a:xfrm>
-            <a:off x="442913" y="3353368"/>
+            <a:off x="232173" y="3321399"/>
             <a:ext cx="2667000" cy="1845553"/>
           </a:xfrm>
           <a:prstGeom prst="rect">
@@ -6941,7 +6950,7 @@
         </p:blipFill>
         <p:spPr>
           <a:xfrm>
-            <a:off x="542926" y="4922303"/>
+            <a:off x="332186" y="4922303"/>
             <a:ext cx="2466974" cy="1707136"/>
           </a:xfrm>
           <a:prstGeom prst="rect">
@@ -6971,7 +6980,7 @@
         </p:blipFill>
         <p:spPr>
           <a:xfrm>
-            <a:off x="3209926" y="4558033"/>
+            <a:off x="3062062" y="4549150"/>
             <a:ext cx="1795531" cy="1217838"/>
           </a:xfrm>
           <a:prstGeom prst="rect">
@@ -6987,8 +6996,8 @@
         </p:nvSpPr>
         <p:spPr>
           <a:xfrm>
-            <a:off x="5205483" y="3850019"/>
-            <a:ext cx="3738492" cy="2616101"/>
+            <a:off x="5020482" y="3850018"/>
+            <a:ext cx="4033767" cy="2616101"/>
           </a:xfrm>
           <a:prstGeom prst="rect">
             <a:avLst/>
@@ -7013,6 +7022,41 @@
               </a:rPr>
               <a:t> Export</a:t>
             </a:r>
+          </a:p>
+          <a:p>
+            <a:r>
+              <a:rPr lang="en-GB" b="1" dirty="0" smtClean="0">
+                <a:latin typeface="Calibri" panose="020F0502020204030204" pitchFamily="34" charset="0"/>
+              </a:rPr>
+              <a:t>GUI: </a:t>
+            </a:r>
+            <a:r>
+              <a:rPr lang="en-GB" dirty="0" smtClean="0">
+                <a:latin typeface="Calibri" panose="020F0502020204030204" pitchFamily="34" charset="0"/>
+              </a:rPr>
+              <a:t>Select </a:t>
+            </a:r>
+            <a:r>
+              <a:rPr lang="en-GB" i="1" dirty="0" smtClean="0">
+                <a:latin typeface="Calibri" panose="020F0502020204030204" pitchFamily="34" charset="0"/>
+              </a:rPr>
+              <a:t>File -&gt; Export -&gt; </a:t>
+            </a:r>
+            <a:r>
+              <a:rPr lang="en-GB" i="1" dirty="0" err="1" smtClean="0">
+                <a:latin typeface="Calibri" panose="020F0502020204030204" pitchFamily="34" charset="0"/>
+              </a:rPr>
+              <a:t>Tetgen</a:t>
+            </a:r>
+            <a:r>
+              <a:rPr lang="en-GB" i="1" dirty="0" smtClean="0">
+                <a:latin typeface="Calibri" panose="020F0502020204030204" pitchFamily="34" charset="0"/>
+              </a:rPr>
+              <a:t> Mesh</a:t>
+            </a:r>
+            <a:endParaRPr lang="en-GB" b="1" dirty="0" smtClean="0">
+              <a:latin typeface="Calibri" panose="020F0502020204030204" pitchFamily="34" charset="0"/>
+            </a:endParaRPr>
           </a:p>
           <a:p>
             <a:pPr marL="342900" indent="-342900">
@@ -7128,6 +7172,411 @@
 </p:sld>
 </file>
 
+<file path=ppt/slides/slide19.xml><?xml version="1.0" encoding="utf-8"?>
+<p:sld xmlns:a="http://schemas.openxmlformats.org/drawingml/2006/main" xmlns:r="http://schemas.openxmlformats.org/officeDocument/2006/relationships" xmlns:p="http://schemas.openxmlformats.org/presentationml/2006/main">
+  <p:cSld>
+    <p:spTree>
+      <p:nvGrpSpPr>
+        <p:cNvPr id="1" name=""/>
+        <p:cNvGrpSpPr/>
+        <p:nvPr/>
+      </p:nvGrpSpPr>
+      <p:grpSpPr>
+        <a:xfrm>
+          <a:off x="0" y="0"/>
+          <a:ext cx="0" cy="0"/>
+          <a:chOff x="0" y="0"/>
+          <a:chExt cx="0" cy="0"/>
+        </a:xfrm>
+      </p:grpSpPr>
+      <p:sp>
+        <p:nvSpPr>
+          <p:cNvPr id="2" name="Title 1"/>
+          <p:cNvSpPr>
+            <a:spLocks noGrp="1"/>
+          </p:cNvSpPr>
+          <p:nvPr>
+            <p:ph type="title"/>
+          </p:nvPr>
+        </p:nvSpPr>
+        <p:spPr/>
+        <p:txBody>
+          <a:bodyPr/>
+          <a:lstStyle/>
+          <a:p>
+            <a:r>
+              <a:rPr lang="en-GB" dirty="0" smtClean="0"/>
+              <a:t>Geometry Export	</a:t>
+            </a:r>
+            <a:endParaRPr lang="en-GB" dirty="0"/>
+          </a:p>
+        </p:txBody>
+      </p:sp>
+      <p:sp>
+        <p:nvSpPr>
+          <p:cNvPr id="3" name="TextBox 2"/>
+          <p:cNvSpPr txBox="1"/>
+          <p:nvPr/>
+        </p:nvSpPr>
+        <p:spPr>
+          <a:xfrm>
+            <a:off x="447675" y="876994"/>
+            <a:ext cx="7972425" cy="1200329"/>
+          </a:xfrm>
+          <a:prstGeom prst="rect">
+            <a:avLst/>
+          </a:prstGeom>
+          <a:noFill/>
+        </p:spPr>
+        <p:txBody>
+          <a:bodyPr wrap="square" rtlCol="0">
+            <a:spAutoFit/>
+          </a:bodyPr>
+          <a:lstStyle/>
+          <a:p>
+            <a:r>
+              <a:rPr lang="en-GB" sz="2400" dirty="0" smtClean="0">
+                <a:latin typeface="+mj-lt"/>
+              </a:rPr>
+              <a:t>The geometry alone can be exported in IGES, STEP or </a:t>
+            </a:r>
+            <a:r>
+              <a:rPr lang="en-GB" sz="2400" dirty="0" err="1" smtClean="0">
+                <a:latin typeface="+mj-lt"/>
+              </a:rPr>
+              <a:t>stl</a:t>
+            </a:r>
+            <a:r>
+              <a:rPr lang="en-GB" sz="2400" dirty="0" smtClean="0">
+                <a:latin typeface="+mj-lt"/>
+              </a:rPr>
+              <a:t> format. No orientations, volume fractions or properties are exported.</a:t>
+            </a:r>
+          </a:p>
+        </p:txBody>
+      </p:sp>
+      <p:sp>
+        <p:nvSpPr>
+          <p:cNvPr id="4" name="Rectangle 3"/>
+          <p:cNvSpPr/>
+          <p:nvPr/>
+        </p:nvSpPr>
+        <p:spPr>
+          <a:xfrm>
+            <a:off x="447675" y="2397495"/>
+            <a:ext cx="3957237" cy="707886"/>
+          </a:xfrm>
+          <a:prstGeom prst="rect">
+            <a:avLst/>
+          </a:prstGeom>
+        </p:spPr>
+        <p:txBody>
+          <a:bodyPr wrap="none">
+            <a:spAutoFit/>
+          </a:bodyPr>
+          <a:lstStyle/>
+          <a:p>
+            <a:r>
+              <a:rPr lang="en-GB" sz="2000" b="1" dirty="0">
+                <a:latin typeface="Calibri" panose="020F0502020204030204" pitchFamily="34" charset="0"/>
+              </a:rPr>
+              <a:t>GUI: </a:t>
+            </a:r>
+            <a:r>
+              <a:rPr lang="en-GB" sz="2000" dirty="0">
+                <a:latin typeface="Calibri" panose="020F0502020204030204" pitchFamily="34" charset="0"/>
+              </a:rPr>
+              <a:t>Select </a:t>
+            </a:r>
+            <a:r>
+              <a:rPr lang="en-GB" sz="2000" i="1" dirty="0">
+                <a:latin typeface="Calibri" panose="020F0502020204030204" pitchFamily="34" charset="0"/>
+              </a:rPr>
+              <a:t>File -&gt; Export -&gt; </a:t>
+            </a:r>
+            <a:r>
+              <a:rPr lang="en-GB" sz="2000" i="1" dirty="0" smtClean="0">
+                <a:latin typeface="Calibri" panose="020F0502020204030204" pitchFamily="34" charset="0"/>
+              </a:rPr>
+              <a:t>IGES File</a:t>
+            </a:r>
+          </a:p>
+          <a:p>
+            <a:r>
+              <a:rPr lang="en-GB" sz="2000" i="1" dirty="0">
+                <a:latin typeface="Calibri" panose="020F0502020204030204" pitchFamily="34" charset="0"/>
+              </a:rPr>
+              <a:t>	</a:t>
+            </a:r>
+            <a:r>
+              <a:rPr lang="en-GB" sz="2000" i="1" dirty="0" smtClean="0">
+                <a:latin typeface="Calibri" panose="020F0502020204030204" pitchFamily="34" charset="0"/>
+              </a:rPr>
+              <a:t>or -&gt; STEP File</a:t>
+            </a:r>
+            <a:endParaRPr lang="en-GB" sz="2000" dirty="0">
+              <a:latin typeface="Calibri" panose="020F0502020204030204" pitchFamily="34" charset="0"/>
+            </a:endParaRPr>
+          </a:p>
+        </p:txBody>
+      </p:sp>
+      <p:pic>
+        <p:nvPicPr>
+          <p:cNvPr id="5" name="Picture 4"/>
+          <p:cNvPicPr>
+            <a:picLocks noChangeAspect="1"/>
+          </p:cNvPicPr>
+          <p:nvPr/>
+        </p:nvPicPr>
+        <p:blipFill>
+          <a:blip r:embed="rId2">
+            <a:extLst>
+              <a:ext uri="{28A0092B-C50C-407E-A947-70E740481C1C}">
+                <a14:useLocalDpi xmlns:a14="http://schemas.microsoft.com/office/drawing/2010/main" val="0"/>
+              </a:ext>
+            </a:extLst>
+          </a:blip>
+          <a:stretch>
+            <a:fillRect/>
+          </a:stretch>
+        </p:blipFill>
+        <p:spPr>
+          <a:xfrm>
+            <a:off x="6619264" y="2077323"/>
+            <a:ext cx="1657962" cy="1729272"/>
+          </a:xfrm>
+          <a:prstGeom prst="rect">
+            <a:avLst/>
+          </a:prstGeom>
+        </p:spPr>
+      </p:pic>
+      <p:sp>
+        <p:nvSpPr>
+          <p:cNvPr id="6" name="TextBox 5"/>
+          <p:cNvSpPr txBox="1"/>
+          <p:nvPr/>
+        </p:nvSpPr>
+        <p:spPr>
+          <a:xfrm>
+            <a:off x="447675" y="3105381"/>
+            <a:ext cx="5924550" cy="1631216"/>
+          </a:xfrm>
+          <a:prstGeom prst="rect">
+            <a:avLst/>
+          </a:prstGeom>
+          <a:noFill/>
+        </p:spPr>
+        <p:txBody>
+          <a:bodyPr wrap="square" rtlCol="0">
+            <a:spAutoFit/>
+          </a:bodyPr>
+          <a:lstStyle/>
+          <a:p>
+            <a:pPr marL="342900" indent="-342900">
+              <a:buFont typeface="Arial" panose="020B0604020202020204" pitchFamily="34" charset="0"/>
+              <a:buChar char="•"/>
+            </a:pPr>
+            <a:r>
+              <a:rPr lang="en-GB" sz="2000" dirty="0" smtClean="0">
+                <a:latin typeface="Calibri" panose="020F0502020204030204" pitchFamily="34" charset="0"/>
+              </a:rPr>
+              <a:t>This option uses the </a:t>
+            </a:r>
+            <a:r>
+              <a:rPr lang="en-GB" sz="2000" dirty="0" err="1" smtClean="0">
+                <a:latin typeface="Calibri" panose="020F0502020204030204" pitchFamily="34" charset="0"/>
+              </a:rPr>
+              <a:t>OpenCASCADE</a:t>
+            </a:r>
+            <a:r>
+              <a:rPr lang="en-GB" sz="2000" dirty="0" smtClean="0">
+                <a:latin typeface="Calibri" panose="020F0502020204030204" pitchFamily="34" charset="0"/>
+              </a:rPr>
+              <a:t> library. </a:t>
+            </a:r>
+          </a:p>
+          <a:p>
+            <a:pPr marL="342900" indent="-342900">
+              <a:buFont typeface="Arial" panose="020B0604020202020204" pitchFamily="34" charset="0"/>
+              <a:buChar char="•"/>
+            </a:pPr>
+            <a:r>
+              <a:rPr lang="en-GB" sz="2000" dirty="0" smtClean="0">
+                <a:latin typeface="Calibri" panose="020F0502020204030204" pitchFamily="34" charset="0"/>
+              </a:rPr>
+              <a:t>The ‘Smooth’ option may be unsuccessful for more complex geometries</a:t>
+            </a:r>
+          </a:p>
+          <a:p>
+            <a:pPr marL="342900" indent="-342900">
+              <a:buFont typeface="Arial" panose="020B0604020202020204" pitchFamily="34" charset="0"/>
+              <a:buChar char="•"/>
+            </a:pPr>
+            <a:r>
+              <a:rPr lang="en-GB" sz="2000" dirty="0" smtClean="0">
+                <a:latin typeface="Calibri" panose="020F0502020204030204" pitchFamily="34" charset="0"/>
+              </a:rPr>
+              <a:t>‘Join Yarn Sections’ will remove joins at repeat boundaries but is </a:t>
+            </a:r>
+            <a:r>
+              <a:rPr lang="en-GB" sz="2000" u="sng" dirty="0" smtClean="0">
+                <a:latin typeface="Calibri" panose="020F0502020204030204" pitchFamily="34" charset="0"/>
+              </a:rPr>
+              <a:t>much</a:t>
+            </a:r>
+            <a:r>
+              <a:rPr lang="en-GB" sz="2000" dirty="0" smtClean="0">
+                <a:latin typeface="Calibri" panose="020F0502020204030204" pitchFamily="34" charset="0"/>
+              </a:rPr>
+              <a:t> slower</a:t>
+            </a:r>
+            <a:endParaRPr lang="en-GB" sz="2000" dirty="0" smtClean="0">
+              <a:latin typeface="Calibri" panose="020F0502020204030204" pitchFamily="34" charset="0"/>
+            </a:endParaRPr>
+          </a:p>
+        </p:txBody>
+      </p:sp>
+      <p:sp>
+        <p:nvSpPr>
+          <p:cNvPr id="7" name="TextBox 6"/>
+          <p:cNvSpPr txBox="1"/>
+          <p:nvPr/>
+        </p:nvSpPr>
+        <p:spPr>
+          <a:xfrm>
+            <a:off x="447674" y="5066294"/>
+            <a:ext cx="7829551" cy="1015663"/>
+          </a:xfrm>
+          <a:prstGeom prst="rect">
+            <a:avLst/>
+          </a:prstGeom>
+          <a:noFill/>
+        </p:spPr>
+        <p:txBody>
+          <a:bodyPr wrap="square" rtlCol="0">
+            <a:spAutoFit/>
+          </a:bodyPr>
+          <a:lstStyle/>
+          <a:p>
+            <a:r>
+              <a:rPr lang="en-GB" sz="2000" b="1" dirty="0">
+                <a:latin typeface="Calibri" panose="020F0502020204030204" pitchFamily="34" charset="0"/>
+              </a:rPr>
+              <a:t>GUI: </a:t>
+            </a:r>
+            <a:r>
+              <a:rPr lang="en-GB" sz="2000" dirty="0">
+                <a:latin typeface="Calibri" panose="020F0502020204030204" pitchFamily="34" charset="0"/>
+              </a:rPr>
+              <a:t>Select </a:t>
+            </a:r>
+            <a:r>
+              <a:rPr lang="en-GB" sz="2000" i="1" dirty="0">
+                <a:latin typeface="Calibri" panose="020F0502020204030204" pitchFamily="34" charset="0"/>
+              </a:rPr>
+              <a:t>File -&gt; Export -&gt; </a:t>
+            </a:r>
+            <a:r>
+              <a:rPr lang="en-GB" sz="2000" i="1" dirty="0" smtClean="0">
+                <a:latin typeface="Calibri" panose="020F0502020204030204" pitchFamily="34" charset="0"/>
+              </a:rPr>
+              <a:t>Surface Mesh</a:t>
+            </a:r>
+            <a:endParaRPr lang="en-GB" sz="2000" i="1" dirty="0">
+              <a:latin typeface="Calibri" panose="020F0502020204030204" pitchFamily="34" charset="0"/>
+            </a:endParaRPr>
+          </a:p>
+          <a:p>
+            <a:pPr marL="342900" indent="-342900">
+              <a:buFont typeface="Arial" panose="020B0604020202020204" pitchFamily="34" charset="0"/>
+              <a:buChar char="•"/>
+            </a:pPr>
+            <a:r>
+              <a:rPr lang="en-GB" sz="2000" dirty="0" smtClean="0">
+                <a:latin typeface="Calibri" panose="020F0502020204030204" pitchFamily="34" charset="0"/>
+              </a:rPr>
+              <a:t>Exports the surface mesh as displayed by </a:t>
+            </a:r>
+            <a:r>
+              <a:rPr lang="en-GB" sz="2000" i="1" dirty="0" smtClean="0">
+                <a:latin typeface="Calibri" panose="020F0502020204030204" pitchFamily="34" charset="0"/>
+              </a:rPr>
+              <a:t>Rendering -&gt; X-Ray</a:t>
+            </a:r>
+          </a:p>
+          <a:p>
+            <a:pPr marL="342900" indent="-342900">
+              <a:buFont typeface="Arial" panose="020B0604020202020204" pitchFamily="34" charset="0"/>
+              <a:buChar char="•"/>
+            </a:pPr>
+            <a:r>
+              <a:rPr lang="en-GB" sz="2000" dirty="0" smtClean="0">
+                <a:latin typeface="Calibri" panose="020F0502020204030204" pitchFamily="34" charset="0"/>
+              </a:rPr>
+              <a:t>Saves in .</a:t>
+            </a:r>
+            <a:r>
+              <a:rPr lang="en-GB" sz="2000" dirty="0" err="1" smtClean="0">
+                <a:latin typeface="Calibri" panose="020F0502020204030204" pitchFamily="34" charset="0"/>
+              </a:rPr>
+              <a:t>vtu</a:t>
+            </a:r>
+            <a:r>
+              <a:rPr lang="en-GB" sz="2000" dirty="0" smtClean="0">
+                <a:latin typeface="Calibri" panose="020F0502020204030204" pitchFamily="34" charset="0"/>
+              </a:rPr>
+              <a:t> or .</a:t>
+            </a:r>
+            <a:r>
+              <a:rPr lang="en-GB" sz="2000" dirty="0" err="1" smtClean="0">
+                <a:latin typeface="Calibri" panose="020F0502020204030204" pitchFamily="34" charset="0"/>
+              </a:rPr>
+              <a:t>stl</a:t>
+            </a:r>
+            <a:r>
+              <a:rPr lang="en-GB" sz="2000" dirty="0" smtClean="0">
+                <a:latin typeface="Calibri" panose="020F0502020204030204" pitchFamily="34" charset="0"/>
+              </a:rPr>
+              <a:t> format</a:t>
+            </a:r>
+            <a:endParaRPr lang="en-GB" sz="2000" dirty="0" smtClean="0">
+              <a:latin typeface="Calibri" panose="020F0502020204030204" pitchFamily="34" charset="0"/>
+            </a:endParaRPr>
+          </a:p>
+        </p:txBody>
+      </p:sp>
+    </p:spTree>
+    <p:extLst>
+      <p:ext uri="{BB962C8B-B14F-4D97-AF65-F5344CB8AC3E}">
+        <p14:creationId xmlns:p14="http://schemas.microsoft.com/office/powerpoint/2010/main" val="2759895364"/>
+      </p:ext>
+    </p:extLst>
+  </p:cSld>
+  <p:clrMapOvr>
+    <a:masterClrMapping/>
+  </p:clrMapOvr>
+  <mc:AlternateContent xmlns:mc="http://schemas.openxmlformats.org/markup-compatibility/2006" xmlns:p14="http://schemas.microsoft.com/office/powerpoint/2010/main">
+    <mc:Choice Requires="p14">
+      <p:transition spd="med" p14:dur="700">
+        <p:fade/>
+      </p:transition>
+    </mc:Choice>
+    <mc:Fallback xmlns="">
+      <p:transition spd="med">
+        <p:fade/>
+      </p:transition>
+    </mc:Fallback>
+  </mc:AlternateContent>
+  <p:timing>
+    <p:tnLst>
+      <p:par>
+        <p:cTn id="1" dur="indefinite" restart="never" nodeType="tmRoot"/>
+      </p:par>
+    </p:tnLst>
+  </p:timing>
+</p:sld>
+</file>
+
 <file path=ppt/slides/slide2.xml><?xml version="1.0" encoding="utf-8"?>
 <p:sld xmlns:a="http://schemas.openxmlformats.org/drawingml/2006/main" xmlns:r="http://schemas.openxmlformats.org/officeDocument/2006/relationships" xmlns:p="http://schemas.openxmlformats.org/presentationml/2006/main">
   <p:cSld>
@@ -8463,6 +8912,2080 @@
       </p:transition>
     </mc:Fallback>
   </mc:AlternateContent>
+  <p:timing>
+    <p:tnLst>
+      <p:par>
+        <p:cTn id="1" dur="indefinite" restart="never" nodeType="tmRoot"/>
+      </p:par>
+    </p:tnLst>
+  </p:timing>
+</p:sld>
+</file>
+
+<file path=ppt/slides/slide20.xml><?xml version="1.0" encoding="utf-8"?>
+<p:sld xmlns:a="http://schemas.openxmlformats.org/drawingml/2006/main" xmlns:r="http://schemas.openxmlformats.org/officeDocument/2006/relationships" xmlns:p="http://schemas.openxmlformats.org/presentationml/2006/main">
+  <p:cSld>
+    <p:spTree>
+      <p:nvGrpSpPr>
+        <p:cNvPr id="1" name=""/>
+        <p:cNvGrpSpPr/>
+        <p:nvPr/>
+      </p:nvGrpSpPr>
+      <p:grpSpPr>
+        <a:xfrm>
+          <a:off x="0" y="0"/>
+          <a:ext cx="0" cy="0"/>
+          <a:chOff x="0" y="0"/>
+          <a:chExt cx="0" cy="0"/>
+        </a:xfrm>
+      </p:grpSpPr>
+      <p:sp>
+        <p:nvSpPr>
+          <p:cNvPr id="2" name="Title 1"/>
+          <p:cNvSpPr>
+            <a:spLocks noGrp="1"/>
+          </p:cNvSpPr>
+          <p:nvPr>
+            <p:ph type="title"/>
+          </p:nvPr>
+        </p:nvSpPr>
+        <p:spPr/>
+        <p:txBody>
+          <a:bodyPr/>
+          <a:lstStyle/>
+          <a:p>
+            <a:r>
+              <a:rPr lang="en-GB" dirty="0" smtClean="0"/>
+              <a:t>Automatically Generated 3D Weaves</a:t>
+            </a:r>
+            <a:endParaRPr lang="en-GB" dirty="0"/>
+          </a:p>
+        </p:txBody>
+      </p:sp>
+      <p:grpSp>
+        <p:nvGrpSpPr>
+          <p:cNvPr id="41" name="Group 40"/>
+          <p:cNvGrpSpPr/>
+          <p:nvPr/>
+        </p:nvGrpSpPr>
+        <p:grpSpPr>
+          <a:xfrm>
+            <a:off x="3892153" y="2091441"/>
+            <a:ext cx="4950610" cy="3405642"/>
+            <a:chOff x="1760070" y="1650922"/>
+            <a:chExt cx="4950610" cy="3405642"/>
+          </a:xfrm>
+        </p:grpSpPr>
+        <p:pic>
+          <p:nvPicPr>
+            <p:cNvPr id="3" name="Picture 2"/>
+            <p:cNvPicPr/>
+            <p:nvPr/>
+          </p:nvPicPr>
+          <p:blipFill rotWithShape="1">
+            <a:blip r:embed="rId2" cstate="print">
+              <a:extLst>
+                <a:ext uri="{28A0092B-C50C-407E-A947-70E740481C1C}">
+                  <a14:useLocalDpi xmlns:a14="http://schemas.microsoft.com/office/drawing/2010/main" val="0"/>
+                </a:ext>
+              </a:extLst>
+            </a:blip>
+            <a:srcRect l="9871" t="30320" r="6884" b="25132"/>
+            <a:stretch/>
+          </p:blipFill>
+          <p:spPr bwMode="auto">
+            <a:xfrm>
+              <a:off x="2433320" y="1906587"/>
+              <a:ext cx="4277360" cy="3044825"/>
+            </a:xfrm>
+            <a:prstGeom prst="rect">
+              <a:avLst/>
+            </a:prstGeom>
+            <a:ln>
+              <a:noFill/>
+            </a:ln>
+            <a:extLst>
+              <a:ext uri="{53640926-AAD7-44D8-BBD7-CCE9431645EC}">
+                <a14:shadowObscured xmlns:a14="http://schemas.microsoft.com/office/drawing/2010/main"/>
+              </a:ext>
+            </a:extLst>
+          </p:spPr>
+        </p:pic>
+        <p:grpSp>
+          <p:nvGrpSpPr>
+            <p:cNvPr id="5" name="Group 4"/>
+            <p:cNvGrpSpPr/>
+            <p:nvPr/>
+          </p:nvGrpSpPr>
+          <p:grpSpPr>
+            <a:xfrm>
+              <a:off x="4122500" y="1789748"/>
+              <a:ext cx="2401568" cy="840106"/>
+              <a:chOff x="0" y="0"/>
+              <a:chExt cx="2401847" cy="840133"/>
+            </a:xfrm>
+          </p:grpSpPr>
+          <p:sp>
+            <p:nvSpPr>
+              <p:cNvPr id="6" name="Text Box 486"/>
+              <p:cNvSpPr txBox="1"/>
+              <p:nvPr/>
+            </p:nvSpPr>
+            <p:spPr>
+              <a:xfrm>
+                <a:off x="1987827" y="564543"/>
+                <a:ext cx="414020" cy="275590"/>
+              </a:xfrm>
+              <a:prstGeom prst="rect">
+                <a:avLst/>
+              </a:prstGeom>
+              <a:noFill/>
+              <a:ln w="6350">
+                <a:noFill/>
+              </a:ln>
+              <a:effectLst/>
+            </p:spPr>
+            <p:style>
+              <a:lnRef idx="0">
+                <a:schemeClr val="accent1"/>
+              </a:lnRef>
+              <a:fillRef idx="0">
+                <a:schemeClr val="accent1"/>
+              </a:fillRef>
+              <a:effectRef idx="0">
+                <a:schemeClr val="accent1"/>
+              </a:effectRef>
+              <a:fontRef idx="minor">
+                <a:schemeClr val="dk1"/>
+              </a:fontRef>
+            </p:style>
+            <p:txBody>
+              <a:bodyPr rot="0" spcFirstLastPara="0" vert="horz" wrap="square" lIns="18000" tIns="18000" rIns="18000" bIns="18000" numCol="1" spcCol="0" rtlCol="0" fromWordArt="0" anchor="t" anchorCtr="0" forceAA="0" compatLnSpc="1">
+                <a:prstTxWarp prst="textNoShape">
+                  <a:avLst/>
+                </a:prstTxWarp>
+                <a:noAutofit/>
+              </a:bodyPr>
+              <a:lstStyle/>
+              <a:p>
+                <a:pPr algn="ctr">
+                  <a:spcAft>
+                    <a:spcPts val="0"/>
+                  </a:spcAft>
+                </a:pPr>
+                <a:r>
+                  <a:rPr lang="en-GB" sz="1200">
+                    <a:effectLst/>
+                    <a:latin typeface="Times New Roman" panose="02020603050405020304" pitchFamily="18" charset="0"/>
+                    <a:ea typeface="Calibri" panose="020F0502020204030204" pitchFamily="34" charset="0"/>
+                  </a:rPr>
+                  <a:t>3</a:t>
+                </a:r>
+              </a:p>
+            </p:txBody>
+          </p:sp>
+          <p:sp>
+            <p:nvSpPr>
+              <p:cNvPr id="7" name="Text Box 487"/>
+              <p:cNvSpPr txBox="1"/>
+              <p:nvPr/>
+            </p:nvSpPr>
+            <p:spPr>
+              <a:xfrm>
+                <a:off x="1160891" y="71562"/>
+                <a:ext cx="414020" cy="275590"/>
+              </a:xfrm>
+              <a:prstGeom prst="rect">
+                <a:avLst/>
+              </a:prstGeom>
+              <a:noFill/>
+              <a:ln w="6350">
+                <a:noFill/>
+              </a:ln>
+              <a:effectLst/>
+            </p:spPr>
+            <p:style>
+              <a:lnRef idx="0">
+                <a:schemeClr val="accent1"/>
+              </a:lnRef>
+              <a:fillRef idx="0">
+                <a:schemeClr val="accent1"/>
+              </a:fillRef>
+              <a:effectRef idx="0">
+                <a:schemeClr val="accent1"/>
+              </a:effectRef>
+              <a:fontRef idx="minor">
+                <a:schemeClr val="dk1"/>
+              </a:fontRef>
+            </p:style>
+            <p:txBody>
+              <a:bodyPr rot="0" spcFirstLastPara="0" vert="horz" wrap="square" lIns="18000" tIns="18000" rIns="18000" bIns="18000" numCol="1" spcCol="0" rtlCol="0" fromWordArt="0" anchor="t" anchorCtr="0" forceAA="0" compatLnSpc="1">
+                <a:prstTxWarp prst="textNoShape">
+                  <a:avLst/>
+                </a:prstTxWarp>
+                <a:noAutofit/>
+              </a:bodyPr>
+              <a:lstStyle/>
+              <a:p>
+                <a:pPr algn="ctr">
+                  <a:spcAft>
+                    <a:spcPts val="0"/>
+                  </a:spcAft>
+                </a:pPr>
+                <a:r>
+                  <a:rPr lang="en-GB" sz="1200" i="1">
+                    <a:effectLst/>
+                    <a:latin typeface="Times New Roman" panose="02020603050405020304" pitchFamily="18" charset="0"/>
+                    <a:ea typeface="Calibri" panose="020F0502020204030204" pitchFamily="34" charset="0"/>
+                  </a:rPr>
+                  <a:t>i</a:t>
+                </a:r>
+                <a:r>
+                  <a:rPr lang="en-GB" sz="1200" i="1" baseline="-25000">
+                    <a:effectLst/>
+                    <a:latin typeface="Times New Roman" panose="02020603050405020304" pitchFamily="18" charset="0"/>
+                    <a:ea typeface="Calibri" panose="020F0502020204030204" pitchFamily="34" charset="0"/>
+                  </a:rPr>
+                  <a:t>x</a:t>
+                </a:r>
+                <a:endParaRPr lang="en-GB" sz="1200">
+                  <a:effectLst/>
+                  <a:latin typeface="Times New Roman" panose="02020603050405020304" pitchFamily="18" charset="0"/>
+                  <a:ea typeface="Calibri" panose="020F0502020204030204" pitchFamily="34" charset="0"/>
+                </a:endParaRPr>
+              </a:p>
+            </p:txBody>
+          </p:sp>
+          <p:sp>
+            <p:nvSpPr>
+              <p:cNvPr id="8" name="Text Box 488"/>
+              <p:cNvSpPr txBox="1"/>
+              <p:nvPr/>
+            </p:nvSpPr>
+            <p:spPr>
+              <a:xfrm>
+                <a:off x="0" y="0"/>
+                <a:ext cx="414020" cy="275590"/>
+              </a:xfrm>
+              <a:prstGeom prst="rect">
+                <a:avLst/>
+              </a:prstGeom>
+              <a:noFill/>
+              <a:ln w="6350">
+                <a:noFill/>
+              </a:ln>
+              <a:effectLst/>
+            </p:spPr>
+            <p:style>
+              <a:lnRef idx="0">
+                <a:schemeClr val="accent1"/>
+              </a:lnRef>
+              <a:fillRef idx="0">
+                <a:schemeClr val="accent1"/>
+              </a:fillRef>
+              <a:effectRef idx="0">
+                <a:schemeClr val="accent1"/>
+              </a:effectRef>
+              <a:fontRef idx="minor">
+                <a:schemeClr val="dk1"/>
+              </a:fontRef>
+            </p:style>
+            <p:txBody>
+              <a:bodyPr rot="0" spcFirstLastPara="0" vert="horz" wrap="square" lIns="18000" tIns="18000" rIns="18000" bIns="18000" numCol="1" spcCol="0" rtlCol="0" fromWordArt="0" anchor="t" anchorCtr="0" forceAA="0" compatLnSpc="1">
+                <a:prstTxWarp prst="textNoShape">
+                  <a:avLst/>
+                </a:prstTxWarp>
+                <a:noAutofit/>
+              </a:bodyPr>
+              <a:lstStyle/>
+              <a:p>
+                <a:pPr algn="ctr">
+                  <a:spcAft>
+                    <a:spcPts val="0"/>
+                  </a:spcAft>
+                </a:pPr>
+                <a:r>
+                  <a:rPr lang="en-GB" sz="1200">
+                    <a:effectLst/>
+                    <a:latin typeface="Times New Roman" panose="02020603050405020304" pitchFamily="18" charset="0"/>
+                    <a:ea typeface="Calibri" panose="020F0502020204030204" pitchFamily="34" charset="0"/>
+                  </a:rPr>
+                  <a:t>0</a:t>
+                </a:r>
+              </a:p>
+            </p:txBody>
+          </p:sp>
+          <p:sp>
+            <p:nvSpPr>
+              <p:cNvPr id="9" name="Text Box 489"/>
+              <p:cNvSpPr txBox="1"/>
+              <p:nvPr/>
+            </p:nvSpPr>
+            <p:spPr>
+              <a:xfrm>
+                <a:off x="604300" y="182880"/>
+                <a:ext cx="414020" cy="275590"/>
+              </a:xfrm>
+              <a:prstGeom prst="rect">
+                <a:avLst/>
+              </a:prstGeom>
+              <a:noFill/>
+              <a:ln w="6350">
+                <a:noFill/>
+              </a:ln>
+              <a:effectLst/>
+            </p:spPr>
+            <p:style>
+              <a:lnRef idx="0">
+                <a:schemeClr val="accent1"/>
+              </a:lnRef>
+              <a:fillRef idx="0">
+                <a:schemeClr val="accent1"/>
+              </a:fillRef>
+              <a:effectRef idx="0">
+                <a:schemeClr val="accent1"/>
+              </a:effectRef>
+              <a:fontRef idx="minor">
+                <a:schemeClr val="dk1"/>
+              </a:fontRef>
+            </p:style>
+            <p:txBody>
+              <a:bodyPr rot="0" spcFirstLastPara="0" vert="horz" wrap="square" lIns="18000" tIns="18000" rIns="18000" bIns="18000" numCol="1" spcCol="0" rtlCol="0" fromWordArt="0" anchor="t" anchorCtr="0" forceAA="0" compatLnSpc="1">
+                <a:prstTxWarp prst="textNoShape">
+                  <a:avLst/>
+                </a:prstTxWarp>
+                <a:noAutofit/>
+              </a:bodyPr>
+              <a:lstStyle/>
+              <a:p>
+                <a:pPr algn="ctr">
+                  <a:spcAft>
+                    <a:spcPts val="0"/>
+                  </a:spcAft>
+                </a:pPr>
+                <a:r>
+                  <a:rPr lang="en-GB" sz="1200">
+                    <a:effectLst/>
+                    <a:latin typeface="Times New Roman" panose="02020603050405020304" pitchFamily="18" charset="0"/>
+                    <a:ea typeface="Calibri" panose="020F0502020204030204" pitchFamily="34" charset="0"/>
+                  </a:rPr>
+                  <a:t>1</a:t>
+                </a:r>
+              </a:p>
+            </p:txBody>
+          </p:sp>
+          <p:sp>
+            <p:nvSpPr>
+              <p:cNvPr id="10" name="Text Box 490"/>
+              <p:cNvSpPr txBox="1"/>
+              <p:nvPr/>
+            </p:nvSpPr>
+            <p:spPr>
+              <a:xfrm>
+                <a:off x="1256307" y="349858"/>
+                <a:ext cx="414020" cy="275590"/>
+              </a:xfrm>
+              <a:prstGeom prst="rect">
+                <a:avLst/>
+              </a:prstGeom>
+              <a:noFill/>
+              <a:ln w="6350">
+                <a:noFill/>
+              </a:ln>
+              <a:effectLst/>
+            </p:spPr>
+            <p:style>
+              <a:lnRef idx="0">
+                <a:schemeClr val="accent1"/>
+              </a:lnRef>
+              <a:fillRef idx="0">
+                <a:schemeClr val="accent1"/>
+              </a:fillRef>
+              <a:effectRef idx="0">
+                <a:schemeClr val="accent1"/>
+              </a:effectRef>
+              <a:fontRef idx="minor">
+                <a:schemeClr val="dk1"/>
+              </a:fontRef>
+            </p:style>
+            <p:txBody>
+              <a:bodyPr rot="0" spcFirstLastPara="0" vert="horz" wrap="square" lIns="18000" tIns="18000" rIns="18000" bIns="18000" numCol="1" spcCol="0" rtlCol="0" fromWordArt="0" anchor="t" anchorCtr="0" forceAA="0" compatLnSpc="1">
+                <a:prstTxWarp prst="textNoShape">
+                  <a:avLst/>
+                </a:prstTxWarp>
+                <a:noAutofit/>
+              </a:bodyPr>
+              <a:lstStyle/>
+              <a:p>
+                <a:pPr algn="ctr">
+                  <a:spcAft>
+                    <a:spcPts val="0"/>
+                  </a:spcAft>
+                </a:pPr>
+                <a:r>
+                  <a:rPr lang="en-GB" sz="1200">
+                    <a:effectLst/>
+                    <a:latin typeface="Times New Roman" panose="02020603050405020304" pitchFamily="18" charset="0"/>
+                    <a:ea typeface="Calibri" panose="020F0502020204030204" pitchFamily="34" charset="0"/>
+                  </a:rPr>
+                  <a:t>2</a:t>
+                </a:r>
+              </a:p>
+            </p:txBody>
+          </p:sp>
+        </p:grpSp>
+        <p:grpSp>
+          <p:nvGrpSpPr>
+            <p:cNvPr id="11" name="Group 10"/>
+            <p:cNvGrpSpPr/>
+            <p:nvPr/>
+          </p:nvGrpSpPr>
+          <p:grpSpPr>
+            <a:xfrm>
+              <a:off x="2337487" y="1650922"/>
+              <a:ext cx="1518922" cy="1090296"/>
+              <a:chOff x="0" y="-1"/>
+              <a:chExt cx="1518922" cy="1090296"/>
+            </a:xfrm>
+          </p:grpSpPr>
+          <p:sp>
+            <p:nvSpPr>
+              <p:cNvPr id="12" name="Text Box 477"/>
+              <p:cNvSpPr txBox="1"/>
+              <p:nvPr/>
+            </p:nvSpPr>
+            <p:spPr>
+              <a:xfrm>
+                <a:off x="362309" y="310550"/>
+                <a:ext cx="414020" cy="275590"/>
+              </a:xfrm>
+              <a:prstGeom prst="rect">
+                <a:avLst/>
+              </a:prstGeom>
+              <a:noFill/>
+              <a:ln w="6350">
+                <a:noFill/>
+              </a:ln>
+              <a:effectLst/>
+            </p:spPr>
+            <p:style>
+              <a:lnRef idx="0">
+                <a:schemeClr val="accent1"/>
+              </a:lnRef>
+              <a:fillRef idx="0">
+                <a:schemeClr val="accent1"/>
+              </a:fillRef>
+              <a:effectRef idx="0">
+                <a:schemeClr val="accent1"/>
+              </a:effectRef>
+              <a:fontRef idx="minor">
+                <a:schemeClr val="dk1"/>
+              </a:fontRef>
+            </p:style>
+            <p:txBody>
+              <a:bodyPr rot="0" spcFirstLastPara="0" vert="horz" wrap="square" lIns="18000" tIns="18000" rIns="18000" bIns="18000" numCol="1" spcCol="0" rtlCol="0" fromWordArt="0" anchor="t" anchorCtr="0" forceAA="0" compatLnSpc="1">
+                <a:prstTxWarp prst="textNoShape">
+                  <a:avLst/>
+                </a:prstTxWarp>
+                <a:noAutofit/>
+              </a:bodyPr>
+              <a:lstStyle/>
+              <a:p>
+                <a:pPr algn="ctr">
+                  <a:spcAft>
+                    <a:spcPts val="0"/>
+                  </a:spcAft>
+                </a:pPr>
+                <a:r>
+                  <a:rPr lang="en-GB" sz="1200" i="1">
+                    <a:effectLst/>
+                    <a:latin typeface="Times New Roman" panose="02020603050405020304" pitchFamily="18" charset="0"/>
+                    <a:ea typeface="Calibri" panose="020F0502020204030204" pitchFamily="34" charset="0"/>
+                  </a:rPr>
+                  <a:t>i</a:t>
+                </a:r>
+                <a:r>
+                  <a:rPr lang="en-GB" sz="1200" i="1" baseline="-25000">
+                    <a:effectLst/>
+                    <a:latin typeface="Times New Roman" panose="02020603050405020304" pitchFamily="18" charset="0"/>
+                    <a:ea typeface="Calibri" panose="020F0502020204030204" pitchFamily="34" charset="0"/>
+                  </a:rPr>
+                  <a:t>y</a:t>
+                </a:r>
+                <a:endParaRPr lang="en-GB" sz="1200">
+                  <a:effectLst/>
+                  <a:latin typeface="Times New Roman" panose="02020603050405020304" pitchFamily="18" charset="0"/>
+                  <a:ea typeface="Calibri" panose="020F0502020204030204" pitchFamily="34" charset="0"/>
+                </a:endParaRPr>
+              </a:p>
+            </p:txBody>
+          </p:sp>
+          <p:grpSp>
+            <p:nvGrpSpPr>
+              <p:cNvPr id="13" name="Group 12"/>
+              <p:cNvGrpSpPr/>
+              <p:nvPr/>
+            </p:nvGrpSpPr>
+            <p:grpSpPr>
+              <a:xfrm>
+                <a:off x="0" y="-1"/>
+                <a:ext cx="1518922" cy="1090296"/>
+                <a:chOff x="0" y="0"/>
+                <a:chExt cx="1519252" cy="1090644"/>
+              </a:xfrm>
+            </p:grpSpPr>
+            <p:sp>
+              <p:nvSpPr>
+                <p:cNvPr id="14" name="Text Box 479"/>
+                <p:cNvSpPr txBox="1"/>
+                <p:nvPr/>
+              </p:nvSpPr>
+              <p:spPr>
+                <a:xfrm>
+                  <a:off x="0" y="675861"/>
+                  <a:ext cx="414020" cy="275590"/>
+                </a:xfrm>
+                <a:prstGeom prst="rect">
+                  <a:avLst/>
+                </a:prstGeom>
+                <a:noFill/>
+                <a:ln w="6350">
+                  <a:noFill/>
+                </a:ln>
+                <a:effectLst/>
+              </p:spPr>
+              <p:style>
+                <a:lnRef idx="0">
+                  <a:schemeClr val="accent1"/>
+                </a:lnRef>
+                <a:fillRef idx="0">
+                  <a:schemeClr val="accent1"/>
+                </a:fillRef>
+                <a:effectRef idx="0">
+                  <a:schemeClr val="accent1"/>
+                </a:effectRef>
+                <a:fontRef idx="minor">
+                  <a:schemeClr val="dk1"/>
+                </a:fontRef>
+              </p:style>
+              <p:txBody>
+                <a:bodyPr rot="0" spcFirstLastPara="0" vert="horz" wrap="square" lIns="18000" tIns="18000" rIns="18000" bIns="18000" numCol="1" spcCol="0" rtlCol="0" fromWordArt="0" anchor="t" anchorCtr="0" forceAA="0" compatLnSpc="1">
+                  <a:prstTxWarp prst="textNoShape">
+                    <a:avLst/>
+                  </a:prstTxWarp>
+                  <a:noAutofit/>
+                </a:bodyPr>
+                <a:lstStyle/>
+                <a:p>
+                  <a:pPr algn="ctr">
+                    <a:spcAft>
+                      <a:spcPts val="0"/>
+                    </a:spcAft>
+                  </a:pPr>
+                  <a:r>
+                    <a:rPr lang="en-GB" sz="1200">
+                      <a:effectLst/>
+                      <a:latin typeface="Times New Roman" panose="02020603050405020304" pitchFamily="18" charset="0"/>
+                      <a:ea typeface="Calibri" panose="020F0502020204030204" pitchFamily="34" charset="0"/>
+                    </a:rPr>
+                    <a:t>0</a:t>
+                  </a:r>
+                </a:p>
+              </p:txBody>
+            </p:sp>
+            <p:sp>
+              <p:nvSpPr>
+                <p:cNvPr id="15" name="Text Box 480"/>
+                <p:cNvSpPr txBox="1"/>
+                <p:nvPr/>
+              </p:nvSpPr>
+              <p:spPr>
+                <a:xfrm>
+                  <a:off x="580445" y="254442"/>
+                  <a:ext cx="414020" cy="275590"/>
+                </a:xfrm>
+                <a:prstGeom prst="rect">
+                  <a:avLst/>
+                </a:prstGeom>
+                <a:noFill/>
+                <a:ln w="6350">
+                  <a:noFill/>
+                </a:ln>
+                <a:effectLst/>
+              </p:spPr>
+              <p:style>
+                <a:lnRef idx="0">
+                  <a:schemeClr val="accent1"/>
+                </a:lnRef>
+                <a:fillRef idx="0">
+                  <a:schemeClr val="accent1"/>
+                </a:fillRef>
+                <a:effectRef idx="0">
+                  <a:schemeClr val="accent1"/>
+                </a:effectRef>
+                <a:fontRef idx="minor">
+                  <a:schemeClr val="dk1"/>
+                </a:fontRef>
+              </p:style>
+              <p:txBody>
+                <a:bodyPr rot="0" spcFirstLastPara="0" vert="horz" wrap="square" lIns="18000" tIns="18000" rIns="18000" bIns="18000" numCol="1" spcCol="0" rtlCol="0" fromWordArt="0" anchor="t" anchorCtr="0" forceAA="0" compatLnSpc="1">
+                  <a:prstTxWarp prst="textNoShape">
+                    <a:avLst/>
+                  </a:prstTxWarp>
+                  <a:noAutofit/>
+                </a:bodyPr>
+                <a:lstStyle/>
+                <a:p>
+                  <a:pPr algn="ctr">
+                    <a:spcAft>
+                      <a:spcPts val="0"/>
+                    </a:spcAft>
+                  </a:pPr>
+                  <a:r>
+                    <a:rPr lang="en-GB" sz="1200">
+                      <a:effectLst/>
+                      <a:latin typeface="Times New Roman" panose="02020603050405020304" pitchFamily="18" charset="0"/>
+                      <a:ea typeface="Calibri" panose="020F0502020204030204" pitchFamily="34" charset="0"/>
+                    </a:rPr>
+                    <a:t>1</a:t>
+                  </a:r>
+                </a:p>
+              </p:txBody>
+            </p:sp>
+            <p:sp>
+              <p:nvSpPr>
+                <p:cNvPr id="16" name="Text Box 481"/>
+                <p:cNvSpPr txBox="1"/>
+                <p:nvPr/>
+              </p:nvSpPr>
+              <p:spPr>
+                <a:xfrm>
+                  <a:off x="1105232" y="0"/>
+                  <a:ext cx="414020" cy="275590"/>
+                </a:xfrm>
+                <a:prstGeom prst="rect">
+                  <a:avLst/>
+                </a:prstGeom>
+                <a:noFill/>
+                <a:ln w="6350">
+                  <a:noFill/>
+                </a:ln>
+                <a:effectLst/>
+              </p:spPr>
+              <p:style>
+                <a:lnRef idx="0">
+                  <a:schemeClr val="accent1"/>
+                </a:lnRef>
+                <a:fillRef idx="0">
+                  <a:schemeClr val="accent1"/>
+                </a:fillRef>
+                <a:effectRef idx="0">
+                  <a:schemeClr val="accent1"/>
+                </a:effectRef>
+                <a:fontRef idx="minor">
+                  <a:schemeClr val="dk1"/>
+                </a:fontRef>
+              </p:style>
+              <p:txBody>
+                <a:bodyPr rot="0" spcFirstLastPara="0" vert="horz" wrap="square" lIns="18000" tIns="18000" rIns="18000" bIns="18000" numCol="1" spcCol="0" rtlCol="0" fromWordArt="0" anchor="t" anchorCtr="0" forceAA="0" compatLnSpc="1">
+                  <a:prstTxWarp prst="textNoShape">
+                    <a:avLst/>
+                  </a:prstTxWarp>
+                  <a:noAutofit/>
+                </a:bodyPr>
+                <a:lstStyle/>
+                <a:p>
+                  <a:pPr algn="ctr">
+                    <a:spcAft>
+                      <a:spcPts val="0"/>
+                    </a:spcAft>
+                  </a:pPr>
+                  <a:r>
+                    <a:rPr lang="en-GB" sz="1200">
+                      <a:effectLst/>
+                      <a:latin typeface="Times New Roman" panose="02020603050405020304" pitchFamily="18" charset="0"/>
+                      <a:ea typeface="Calibri" panose="020F0502020204030204" pitchFamily="34" charset="0"/>
+                    </a:rPr>
+                    <a:t>2</a:t>
+                  </a:r>
+                </a:p>
+              </p:txBody>
+            </p:sp>
+            <p:cxnSp>
+              <p:nvCxnSpPr>
+                <p:cNvPr id="17" name="Straight Arrow Connector 16"/>
+                <p:cNvCxnSpPr/>
+                <p:nvPr/>
+              </p:nvCxnSpPr>
+              <p:spPr>
+                <a:xfrm>
+                  <a:off x="206734" y="874644"/>
+                  <a:ext cx="0" cy="216000"/>
+                </a:xfrm>
+                <a:prstGeom prst="straightConnector1">
+                  <a:avLst/>
+                </a:prstGeom>
+                <a:ln w="19050">
+                  <a:solidFill>
+                    <a:schemeClr val="tx1"/>
+                  </a:solidFill>
+                  <a:tailEnd type="arrow"/>
+                </a:ln>
+              </p:spPr>
+              <p:style>
+                <a:lnRef idx="1">
+                  <a:schemeClr val="accent1"/>
+                </a:lnRef>
+                <a:fillRef idx="0">
+                  <a:schemeClr val="accent1"/>
+                </a:fillRef>
+                <a:effectRef idx="0">
+                  <a:schemeClr val="accent1"/>
+                </a:effectRef>
+                <a:fontRef idx="minor">
+                  <a:schemeClr val="tx1"/>
+                </a:fontRef>
+              </p:style>
+            </p:cxnSp>
+            <p:cxnSp>
+              <p:nvCxnSpPr>
+                <p:cNvPr id="18" name="Straight Arrow Connector 17"/>
+                <p:cNvCxnSpPr/>
+                <p:nvPr/>
+              </p:nvCxnSpPr>
+              <p:spPr>
+                <a:xfrm>
+                  <a:off x="779228" y="461176"/>
+                  <a:ext cx="0" cy="215900"/>
+                </a:xfrm>
+                <a:prstGeom prst="straightConnector1">
+                  <a:avLst/>
+                </a:prstGeom>
+                <a:ln w="19050">
+                  <a:solidFill>
+                    <a:schemeClr val="tx1"/>
+                  </a:solidFill>
+                  <a:tailEnd type="arrow"/>
+                </a:ln>
+              </p:spPr>
+              <p:style>
+                <a:lnRef idx="1">
+                  <a:schemeClr val="accent1"/>
+                </a:lnRef>
+                <a:fillRef idx="0">
+                  <a:schemeClr val="accent1"/>
+                </a:fillRef>
+                <a:effectRef idx="0">
+                  <a:schemeClr val="accent1"/>
+                </a:effectRef>
+                <a:fontRef idx="minor">
+                  <a:schemeClr val="tx1"/>
+                </a:fontRef>
+              </p:style>
+            </p:cxnSp>
+            <p:cxnSp>
+              <p:nvCxnSpPr>
+                <p:cNvPr id="19" name="Straight Arrow Connector 18"/>
+                <p:cNvCxnSpPr/>
+                <p:nvPr/>
+              </p:nvCxnSpPr>
+              <p:spPr>
+                <a:xfrm>
+                  <a:off x="1311966" y="198783"/>
+                  <a:ext cx="0" cy="216000"/>
+                </a:xfrm>
+                <a:prstGeom prst="straightConnector1">
+                  <a:avLst/>
+                </a:prstGeom>
+                <a:ln w="19050">
+                  <a:solidFill>
+                    <a:schemeClr val="tx1"/>
+                  </a:solidFill>
+                  <a:tailEnd type="arrow"/>
+                </a:ln>
+              </p:spPr>
+              <p:style>
+                <a:lnRef idx="1">
+                  <a:schemeClr val="accent1"/>
+                </a:lnRef>
+                <a:fillRef idx="0">
+                  <a:schemeClr val="accent1"/>
+                </a:fillRef>
+                <a:effectRef idx="0">
+                  <a:schemeClr val="accent1"/>
+                </a:effectRef>
+                <a:fontRef idx="minor">
+                  <a:schemeClr val="tx1"/>
+                </a:fontRef>
+              </p:style>
+            </p:cxnSp>
+          </p:grpSp>
+        </p:grpSp>
+        <p:grpSp>
+          <p:nvGrpSpPr>
+            <p:cNvPr id="21" name="Group 20"/>
+            <p:cNvGrpSpPr/>
+            <p:nvPr/>
+          </p:nvGrpSpPr>
+          <p:grpSpPr>
+            <a:xfrm>
+              <a:off x="1760070" y="2629854"/>
+              <a:ext cx="776605" cy="1332865"/>
+              <a:chOff x="-76033" y="0"/>
+              <a:chExt cx="776963" cy="1333113"/>
+            </a:xfrm>
+          </p:grpSpPr>
+          <p:sp>
+            <p:nvSpPr>
+              <p:cNvPr id="22" name="Text Box 465"/>
+              <p:cNvSpPr txBox="1"/>
+              <p:nvPr/>
+            </p:nvSpPr>
+            <p:spPr>
+              <a:xfrm>
+                <a:off x="159026" y="795130"/>
+                <a:ext cx="414020" cy="275590"/>
+              </a:xfrm>
+              <a:prstGeom prst="rect">
+                <a:avLst/>
+              </a:prstGeom>
+              <a:noFill/>
+              <a:ln w="6350">
+                <a:noFill/>
+              </a:ln>
+              <a:effectLst/>
+            </p:spPr>
+            <p:style>
+              <a:lnRef idx="0">
+                <a:schemeClr val="accent1"/>
+              </a:lnRef>
+              <a:fillRef idx="0">
+                <a:schemeClr val="accent1"/>
+              </a:fillRef>
+              <a:effectRef idx="0">
+                <a:schemeClr val="accent1"/>
+              </a:effectRef>
+              <a:fontRef idx="minor">
+                <a:schemeClr val="dk1"/>
+              </a:fontRef>
+            </p:style>
+            <p:txBody>
+              <a:bodyPr rot="0" spcFirstLastPara="0" vert="horz" wrap="square" lIns="18000" tIns="18000" rIns="18000" bIns="18000" numCol="1" spcCol="0" rtlCol="0" fromWordArt="0" anchor="t" anchorCtr="0" forceAA="0" compatLnSpc="1">
+                <a:prstTxWarp prst="textNoShape">
+                  <a:avLst/>
+                </a:prstTxWarp>
+                <a:noAutofit/>
+              </a:bodyPr>
+              <a:lstStyle/>
+              <a:p>
+                <a:pPr algn="ctr">
+                  <a:spcAft>
+                    <a:spcPts val="0"/>
+                  </a:spcAft>
+                </a:pPr>
+                <a:r>
+                  <a:rPr lang="en-GB" sz="1200">
+                    <a:effectLst/>
+                    <a:latin typeface="Times New Roman" panose="02020603050405020304" pitchFamily="18" charset="0"/>
+                    <a:ea typeface="Calibri" panose="020F0502020204030204" pitchFamily="34" charset="0"/>
+                  </a:rPr>
+                  <a:t>2</a:t>
+                </a:r>
+              </a:p>
+            </p:txBody>
+          </p:sp>
+          <p:sp>
+            <p:nvSpPr>
+              <p:cNvPr id="23" name="Text Box 466"/>
+              <p:cNvSpPr txBox="1"/>
+              <p:nvPr/>
+            </p:nvSpPr>
+            <p:spPr>
+              <a:xfrm>
+                <a:off x="159026" y="262393"/>
+                <a:ext cx="414020" cy="275590"/>
+              </a:xfrm>
+              <a:prstGeom prst="rect">
+                <a:avLst/>
+              </a:prstGeom>
+              <a:noFill/>
+              <a:ln w="6350">
+                <a:noFill/>
+              </a:ln>
+              <a:effectLst/>
+            </p:spPr>
+            <p:style>
+              <a:lnRef idx="0">
+                <a:schemeClr val="accent1"/>
+              </a:lnRef>
+              <a:fillRef idx="0">
+                <a:schemeClr val="accent1"/>
+              </a:fillRef>
+              <a:effectRef idx="0">
+                <a:schemeClr val="accent1"/>
+              </a:effectRef>
+              <a:fontRef idx="minor">
+                <a:schemeClr val="dk1"/>
+              </a:fontRef>
+            </p:style>
+            <p:txBody>
+              <a:bodyPr rot="0" spcFirstLastPara="0" vert="horz" wrap="square" lIns="18000" tIns="18000" rIns="18000" bIns="18000" numCol="1" spcCol="0" rtlCol="0" fromWordArt="0" anchor="t" anchorCtr="0" forceAA="0" compatLnSpc="1">
+                <a:prstTxWarp prst="textNoShape">
+                  <a:avLst/>
+                </a:prstTxWarp>
+                <a:noAutofit/>
+              </a:bodyPr>
+              <a:lstStyle/>
+              <a:p>
+                <a:pPr algn="ctr">
+                  <a:spcAft>
+                    <a:spcPts val="0"/>
+                  </a:spcAft>
+                </a:pPr>
+                <a:r>
+                  <a:rPr lang="en-GB" sz="1200">
+                    <a:effectLst/>
+                    <a:latin typeface="Times New Roman" panose="02020603050405020304" pitchFamily="18" charset="0"/>
+                    <a:ea typeface="Calibri" panose="020F0502020204030204" pitchFamily="34" charset="0"/>
+                  </a:rPr>
+                  <a:t>6</a:t>
+                </a:r>
+              </a:p>
+            </p:txBody>
+          </p:sp>
+          <p:sp>
+            <p:nvSpPr>
+              <p:cNvPr id="24" name="Text Box 467"/>
+              <p:cNvSpPr txBox="1"/>
+              <p:nvPr/>
+            </p:nvSpPr>
+            <p:spPr>
+              <a:xfrm>
+                <a:off x="159026" y="548640"/>
+                <a:ext cx="414020" cy="275590"/>
+              </a:xfrm>
+              <a:prstGeom prst="rect">
+                <a:avLst/>
+              </a:prstGeom>
+              <a:noFill/>
+              <a:ln w="6350">
+                <a:noFill/>
+              </a:ln>
+              <a:effectLst/>
+            </p:spPr>
+            <p:style>
+              <a:lnRef idx="0">
+                <a:schemeClr val="accent1"/>
+              </a:lnRef>
+              <a:fillRef idx="0">
+                <a:schemeClr val="accent1"/>
+              </a:fillRef>
+              <a:effectRef idx="0">
+                <a:schemeClr val="accent1"/>
+              </a:effectRef>
+              <a:fontRef idx="minor">
+                <a:schemeClr val="dk1"/>
+              </a:fontRef>
+            </p:style>
+            <p:txBody>
+              <a:bodyPr rot="0" spcFirstLastPara="0" vert="horz" wrap="square" lIns="18000" tIns="18000" rIns="18000" bIns="18000" numCol="1" spcCol="0" rtlCol="0" fromWordArt="0" anchor="t" anchorCtr="0" forceAA="0" compatLnSpc="1">
+                <a:prstTxWarp prst="textNoShape">
+                  <a:avLst/>
+                </a:prstTxWarp>
+                <a:noAutofit/>
+              </a:bodyPr>
+              <a:lstStyle/>
+              <a:p>
+                <a:pPr algn="ctr">
+                  <a:spcAft>
+                    <a:spcPts val="0"/>
+                  </a:spcAft>
+                </a:pPr>
+                <a:r>
+                  <a:rPr lang="en-GB" sz="1200">
+                    <a:effectLst/>
+                    <a:latin typeface="Times New Roman" panose="02020603050405020304" pitchFamily="18" charset="0"/>
+                    <a:ea typeface="Calibri" panose="020F0502020204030204" pitchFamily="34" charset="0"/>
+                  </a:rPr>
+                  <a:t>4</a:t>
+                </a:r>
+              </a:p>
+            </p:txBody>
+          </p:sp>
+          <p:sp>
+            <p:nvSpPr>
+              <p:cNvPr id="25" name="Text Box 468"/>
+              <p:cNvSpPr txBox="1"/>
+              <p:nvPr/>
+            </p:nvSpPr>
+            <p:spPr>
+              <a:xfrm>
+                <a:off x="159026" y="0"/>
+                <a:ext cx="414020" cy="275590"/>
+              </a:xfrm>
+              <a:prstGeom prst="rect">
+                <a:avLst/>
+              </a:prstGeom>
+              <a:noFill/>
+              <a:ln w="6350">
+                <a:noFill/>
+              </a:ln>
+              <a:effectLst/>
+            </p:spPr>
+            <p:style>
+              <a:lnRef idx="0">
+                <a:schemeClr val="accent1"/>
+              </a:lnRef>
+              <a:fillRef idx="0">
+                <a:schemeClr val="accent1"/>
+              </a:fillRef>
+              <a:effectRef idx="0">
+                <a:schemeClr val="accent1"/>
+              </a:effectRef>
+              <a:fontRef idx="minor">
+                <a:schemeClr val="dk1"/>
+              </a:fontRef>
+            </p:style>
+            <p:txBody>
+              <a:bodyPr rot="0" spcFirstLastPara="0" vert="horz" wrap="square" lIns="18000" tIns="18000" rIns="18000" bIns="18000" numCol="1" spcCol="0" rtlCol="0" fromWordArt="0" anchor="t" anchorCtr="0" forceAA="0" compatLnSpc="1">
+                <a:prstTxWarp prst="textNoShape">
+                  <a:avLst/>
+                </a:prstTxWarp>
+                <a:noAutofit/>
+              </a:bodyPr>
+              <a:lstStyle/>
+              <a:p>
+                <a:pPr algn="ctr">
+                  <a:spcAft>
+                    <a:spcPts val="0"/>
+                  </a:spcAft>
+                </a:pPr>
+                <a:r>
+                  <a:rPr lang="en-GB" sz="1200">
+                    <a:effectLst/>
+                    <a:latin typeface="Times New Roman" panose="02020603050405020304" pitchFamily="18" charset="0"/>
+                    <a:ea typeface="Calibri" panose="020F0502020204030204" pitchFamily="34" charset="0"/>
+                  </a:rPr>
+                  <a:t>8</a:t>
+                </a:r>
+              </a:p>
+            </p:txBody>
+          </p:sp>
+          <p:sp>
+            <p:nvSpPr>
+              <p:cNvPr id="26" name="Text Box 469"/>
+              <p:cNvSpPr txBox="1"/>
+              <p:nvPr/>
+            </p:nvSpPr>
+            <p:spPr>
+              <a:xfrm>
+                <a:off x="159026" y="1057523"/>
+                <a:ext cx="414020" cy="275590"/>
+              </a:xfrm>
+              <a:prstGeom prst="rect">
+                <a:avLst/>
+              </a:prstGeom>
+              <a:noFill/>
+              <a:ln w="6350">
+                <a:noFill/>
+              </a:ln>
+              <a:effectLst/>
+            </p:spPr>
+            <p:style>
+              <a:lnRef idx="0">
+                <a:schemeClr val="accent1"/>
+              </a:lnRef>
+              <a:fillRef idx="0">
+                <a:schemeClr val="accent1"/>
+              </a:fillRef>
+              <a:effectRef idx="0">
+                <a:schemeClr val="accent1"/>
+              </a:effectRef>
+              <a:fontRef idx="minor">
+                <a:schemeClr val="dk1"/>
+              </a:fontRef>
+            </p:style>
+            <p:txBody>
+              <a:bodyPr rot="0" spcFirstLastPara="0" vert="horz" wrap="square" lIns="18000" tIns="18000" rIns="18000" bIns="18000" numCol="1" spcCol="0" rtlCol="0" fromWordArt="0" anchor="t" anchorCtr="0" forceAA="0" compatLnSpc="1">
+                <a:prstTxWarp prst="textNoShape">
+                  <a:avLst/>
+                </a:prstTxWarp>
+                <a:noAutofit/>
+              </a:bodyPr>
+              <a:lstStyle/>
+              <a:p>
+                <a:pPr algn="ctr">
+                  <a:spcAft>
+                    <a:spcPts val="0"/>
+                  </a:spcAft>
+                </a:pPr>
+                <a:r>
+                  <a:rPr lang="en-GB" sz="1200">
+                    <a:effectLst/>
+                    <a:latin typeface="Times New Roman" panose="02020603050405020304" pitchFamily="18" charset="0"/>
+                    <a:ea typeface="Calibri" panose="020F0502020204030204" pitchFamily="34" charset="0"/>
+                  </a:rPr>
+                  <a:t>0</a:t>
+                </a:r>
+              </a:p>
+            </p:txBody>
+          </p:sp>
+          <p:cxnSp>
+            <p:nvCxnSpPr>
+              <p:cNvPr id="27" name="Straight Arrow Connector 26"/>
+              <p:cNvCxnSpPr/>
+              <p:nvPr/>
+            </p:nvCxnSpPr>
+            <p:spPr>
+              <a:xfrm>
+                <a:off x="437322" y="127221"/>
+                <a:ext cx="215900" cy="0"/>
+              </a:xfrm>
+              <a:prstGeom prst="straightConnector1">
+                <a:avLst/>
+              </a:prstGeom>
+              <a:ln w="19050">
+                <a:solidFill>
+                  <a:schemeClr val="tx1"/>
+                </a:solidFill>
+                <a:tailEnd type="arrow"/>
+              </a:ln>
+            </p:spPr>
+            <p:style>
+              <a:lnRef idx="1">
+                <a:schemeClr val="accent1"/>
+              </a:lnRef>
+              <a:fillRef idx="0">
+                <a:schemeClr val="accent1"/>
+              </a:fillRef>
+              <a:effectRef idx="0">
+                <a:schemeClr val="accent1"/>
+              </a:effectRef>
+              <a:fontRef idx="minor">
+                <a:schemeClr val="tx1"/>
+              </a:fontRef>
+            </p:style>
+          </p:cxnSp>
+          <p:cxnSp>
+            <p:nvCxnSpPr>
+              <p:cNvPr id="28" name="Straight Arrow Connector 27"/>
+              <p:cNvCxnSpPr/>
+              <p:nvPr/>
+            </p:nvCxnSpPr>
+            <p:spPr>
+              <a:xfrm>
+                <a:off x="453225" y="389614"/>
+                <a:ext cx="215900" cy="0"/>
+              </a:xfrm>
+              <a:prstGeom prst="straightConnector1">
+                <a:avLst/>
+              </a:prstGeom>
+              <a:ln w="19050">
+                <a:solidFill>
+                  <a:schemeClr val="tx1"/>
+                </a:solidFill>
+                <a:tailEnd type="arrow"/>
+              </a:ln>
+            </p:spPr>
+            <p:style>
+              <a:lnRef idx="1">
+                <a:schemeClr val="accent1"/>
+              </a:lnRef>
+              <a:fillRef idx="0">
+                <a:schemeClr val="accent1"/>
+              </a:fillRef>
+              <a:effectRef idx="0">
+                <a:schemeClr val="accent1"/>
+              </a:effectRef>
+              <a:fontRef idx="minor">
+                <a:schemeClr val="tx1"/>
+              </a:fontRef>
+            </p:style>
+          </p:cxnSp>
+          <p:cxnSp>
+            <p:nvCxnSpPr>
+              <p:cNvPr id="29" name="Straight Arrow Connector 28"/>
+              <p:cNvCxnSpPr/>
+              <p:nvPr/>
+            </p:nvCxnSpPr>
+            <p:spPr>
+              <a:xfrm>
+                <a:off x="485030" y="1184744"/>
+                <a:ext cx="215900" cy="0"/>
+              </a:xfrm>
+              <a:prstGeom prst="straightConnector1">
+                <a:avLst/>
+              </a:prstGeom>
+              <a:ln w="19050">
+                <a:solidFill>
+                  <a:schemeClr val="tx1"/>
+                </a:solidFill>
+                <a:tailEnd type="arrow"/>
+              </a:ln>
+            </p:spPr>
+            <p:style>
+              <a:lnRef idx="1">
+                <a:schemeClr val="accent1"/>
+              </a:lnRef>
+              <a:fillRef idx="0">
+                <a:schemeClr val="accent1"/>
+              </a:fillRef>
+              <a:effectRef idx="0">
+                <a:schemeClr val="accent1"/>
+              </a:effectRef>
+              <a:fontRef idx="minor">
+                <a:schemeClr val="tx1"/>
+              </a:fontRef>
+            </p:style>
+          </p:cxnSp>
+          <p:cxnSp>
+            <p:nvCxnSpPr>
+              <p:cNvPr id="30" name="Straight Arrow Connector 29"/>
+              <p:cNvCxnSpPr/>
+              <p:nvPr/>
+            </p:nvCxnSpPr>
+            <p:spPr>
+              <a:xfrm>
+                <a:off x="469127" y="922351"/>
+                <a:ext cx="215900" cy="0"/>
+              </a:xfrm>
+              <a:prstGeom prst="straightConnector1">
+                <a:avLst/>
+              </a:prstGeom>
+              <a:ln w="19050">
+                <a:solidFill>
+                  <a:schemeClr val="tx1"/>
+                </a:solidFill>
+                <a:tailEnd type="arrow"/>
+              </a:ln>
+            </p:spPr>
+            <p:style>
+              <a:lnRef idx="1">
+                <a:schemeClr val="accent1"/>
+              </a:lnRef>
+              <a:fillRef idx="0">
+                <a:schemeClr val="accent1"/>
+              </a:fillRef>
+              <a:effectRef idx="0">
+                <a:schemeClr val="accent1"/>
+              </a:effectRef>
+              <a:fontRef idx="minor">
+                <a:schemeClr val="tx1"/>
+              </a:fontRef>
+            </p:style>
+          </p:cxnSp>
+          <p:cxnSp>
+            <p:nvCxnSpPr>
+              <p:cNvPr id="31" name="Straight Arrow Connector 30"/>
+              <p:cNvCxnSpPr/>
+              <p:nvPr/>
+            </p:nvCxnSpPr>
+            <p:spPr>
+              <a:xfrm>
+                <a:off x="461176" y="675861"/>
+                <a:ext cx="215900" cy="0"/>
+              </a:xfrm>
+              <a:prstGeom prst="straightConnector1">
+                <a:avLst/>
+              </a:prstGeom>
+              <a:ln w="19050">
+                <a:solidFill>
+                  <a:schemeClr val="tx1"/>
+                </a:solidFill>
+                <a:tailEnd type="arrow"/>
+              </a:ln>
+            </p:spPr>
+            <p:style>
+              <a:lnRef idx="1">
+                <a:schemeClr val="accent1"/>
+              </a:lnRef>
+              <a:fillRef idx="0">
+                <a:schemeClr val="accent1"/>
+              </a:fillRef>
+              <a:effectRef idx="0">
+                <a:schemeClr val="accent1"/>
+              </a:effectRef>
+              <a:fontRef idx="minor">
+                <a:schemeClr val="tx1"/>
+              </a:fontRef>
+            </p:style>
+          </p:cxnSp>
+          <p:sp>
+            <p:nvSpPr>
+              <p:cNvPr id="32" name="Text Box 475"/>
+              <p:cNvSpPr txBox="1"/>
+              <p:nvPr/>
+            </p:nvSpPr>
+            <p:spPr>
+              <a:xfrm>
+                <a:off x="-76033" y="564476"/>
+                <a:ext cx="414020" cy="275590"/>
+              </a:xfrm>
+              <a:prstGeom prst="rect">
+                <a:avLst/>
+              </a:prstGeom>
+              <a:noFill/>
+              <a:ln w="6350">
+                <a:noFill/>
+              </a:ln>
+              <a:effectLst/>
+            </p:spPr>
+            <p:style>
+              <a:lnRef idx="0">
+                <a:schemeClr val="accent1"/>
+              </a:lnRef>
+              <a:fillRef idx="0">
+                <a:schemeClr val="accent1"/>
+              </a:fillRef>
+              <a:effectRef idx="0">
+                <a:schemeClr val="accent1"/>
+              </a:effectRef>
+              <a:fontRef idx="minor">
+                <a:schemeClr val="dk1"/>
+              </a:fontRef>
+            </p:style>
+            <p:txBody>
+              <a:bodyPr rot="0" spcFirstLastPara="0" vert="horz" wrap="square" lIns="18000" tIns="18000" rIns="18000" bIns="18000" numCol="1" spcCol="0" rtlCol="0" fromWordArt="0" anchor="t" anchorCtr="0" forceAA="0" compatLnSpc="1">
+                <a:prstTxWarp prst="textNoShape">
+                  <a:avLst/>
+                </a:prstTxWarp>
+                <a:noAutofit/>
+              </a:bodyPr>
+              <a:lstStyle/>
+              <a:p>
+                <a:pPr algn="ctr">
+                  <a:spcAft>
+                    <a:spcPts val="0"/>
+                  </a:spcAft>
+                </a:pPr>
+                <a:r>
+                  <a:rPr lang="en-GB" sz="1200" i="1">
+                    <a:effectLst/>
+                    <a:latin typeface="Times New Roman" panose="02020603050405020304" pitchFamily="18" charset="0"/>
+                    <a:ea typeface="Calibri" panose="020F0502020204030204" pitchFamily="34" charset="0"/>
+                  </a:rPr>
+                  <a:t>i</a:t>
+                </a:r>
+                <a:r>
+                  <a:rPr lang="en-GB" sz="1200" i="1" baseline="-25000">
+                    <a:effectLst/>
+                    <a:latin typeface="Times New Roman" panose="02020603050405020304" pitchFamily="18" charset="0"/>
+                    <a:ea typeface="Calibri" panose="020F0502020204030204" pitchFamily="34" charset="0"/>
+                  </a:rPr>
+                  <a:t>z</a:t>
+                </a:r>
+                <a:endParaRPr lang="en-GB" sz="1200">
+                  <a:effectLst/>
+                  <a:latin typeface="Times New Roman" panose="02020603050405020304" pitchFamily="18" charset="0"/>
+                  <a:ea typeface="Calibri" panose="020F0502020204030204" pitchFamily="34" charset="0"/>
+                </a:endParaRPr>
+              </a:p>
+            </p:txBody>
+          </p:sp>
+        </p:grpSp>
+        <p:grpSp>
+          <p:nvGrpSpPr>
+            <p:cNvPr id="33" name="Group 32"/>
+            <p:cNvGrpSpPr/>
+            <p:nvPr/>
+          </p:nvGrpSpPr>
+          <p:grpSpPr>
+            <a:xfrm>
+              <a:off x="2699796" y="4134543"/>
+              <a:ext cx="1064261" cy="922021"/>
+              <a:chOff x="0" y="0"/>
+              <a:chExt cx="1064785" cy="922323"/>
+            </a:xfrm>
+          </p:grpSpPr>
+          <p:sp>
+            <p:nvSpPr>
+              <p:cNvPr id="34" name="Text Box 492"/>
+              <p:cNvSpPr txBox="1"/>
+              <p:nvPr/>
+            </p:nvSpPr>
+            <p:spPr>
+              <a:xfrm rot="1226761">
+                <a:off x="71562" y="723568"/>
+                <a:ext cx="631190" cy="198755"/>
+              </a:xfrm>
+              <a:prstGeom prst="rect">
+                <a:avLst/>
+              </a:prstGeom>
+              <a:noFill/>
+              <a:ln w="6350">
+                <a:noFill/>
+              </a:ln>
+              <a:effectLst/>
+            </p:spPr>
+            <p:style>
+              <a:lnRef idx="0">
+                <a:schemeClr val="accent1"/>
+              </a:lnRef>
+              <a:fillRef idx="0">
+                <a:schemeClr val="accent1"/>
+              </a:fillRef>
+              <a:effectRef idx="0">
+                <a:schemeClr val="accent1"/>
+              </a:effectRef>
+              <a:fontRef idx="minor">
+                <a:schemeClr val="dk1"/>
+              </a:fontRef>
+            </p:style>
+            <p:txBody>
+              <a:bodyPr rot="0" spcFirstLastPara="0" vert="horz" wrap="square" lIns="0" tIns="0" rIns="0" bIns="0" numCol="1" spcCol="0" rtlCol="0" fromWordArt="0" anchor="t" anchorCtr="0" forceAA="0" compatLnSpc="1">
+                <a:prstTxWarp prst="textNoShape">
+                  <a:avLst/>
+                </a:prstTxWarp>
+                <a:noAutofit/>
+              </a:bodyPr>
+              <a:lstStyle/>
+              <a:p>
+                <a:pPr>
+                  <a:spcAft>
+                    <a:spcPts val="0"/>
+                  </a:spcAft>
+                </a:pPr>
+                <a:r>
+                  <a:rPr lang="en-GB" sz="1200">
+                    <a:effectLst/>
+                    <a:latin typeface="Times New Roman" panose="02020603050405020304" pitchFamily="18" charset="0"/>
+                    <a:ea typeface="Calibri" panose="020F0502020204030204" pitchFamily="34" charset="0"/>
+                  </a:rPr>
+                  <a:t>Warp (x)</a:t>
+                </a:r>
+              </a:p>
+            </p:txBody>
+          </p:sp>
+          <p:sp>
+            <p:nvSpPr>
+              <p:cNvPr id="35" name="Text Box 493"/>
+              <p:cNvSpPr txBox="1"/>
+              <p:nvPr/>
+            </p:nvSpPr>
+            <p:spPr>
+              <a:xfrm rot="19862080">
+                <a:off x="485030" y="357808"/>
+                <a:ext cx="579755" cy="180340"/>
+              </a:xfrm>
+              <a:prstGeom prst="rect">
+                <a:avLst/>
+              </a:prstGeom>
+              <a:noFill/>
+              <a:ln w="6350">
+                <a:noFill/>
+              </a:ln>
+              <a:effectLst/>
+            </p:spPr>
+            <p:style>
+              <a:lnRef idx="0">
+                <a:schemeClr val="accent1"/>
+              </a:lnRef>
+              <a:fillRef idx="0">
+                <a:schemeClr val="accent1"/>
+              </a:fillRef>
+              <a:effectRef idx="0">
+                <a:schemeClr val="accent1"/>
+              </a:effectRef>
+              <a:fontRef idx="minor">
+                <a:schemeClr val="dk1"/>
+              </a:fontRef>
+            </p:style>
+            <p:txBody>
+              <a:bodyPr rot="0" spcFirstLastPara="0" vert="horz" wrap="square" lIns="0" tIns="0" rIns="0" bIns="0" numCol="1" spcCol="0" rtlCol="0" fromWordArt="0" anchor="t" anchorCtr="0" forceAA="0" compatLnSpc="1">
+                <a:prstTxWarp prst="textNoShape">
+                  <a:avLst/>
+                </a:prstTxWarp>
+                <a:noAutofit/>
+              </a:bodyPr>
+              <a:lstStyle/>
+              <a:p>
+                <a:pPr>
+                  <a:spcAft>
+                    <a:spcPts val="0"/>
+                  </a:spcAft>
+                </a:pPr>
+                <a:r>
+                  <a:rPr lang="en-GB" sz="1200">
+                    <a:effectLst/>
+                    <a:latin typeface="Times New Roman" panose="02020603050405020304" pitchFamily="18" charset="0"/>
+                    <a:ea typeface="Calibri" panose="020F0502020204030204" pitchFamily="34" charset="0"/>
+                  </a:rPr>
+                  <a:t>Weft (y)</a:t>
+                </a:r>
+              </a:p>
+            </p:txBody>
+          </p:sp>
+          <p:grpSp>
+            <p:nvGrpSpPr>
+              <p:cNvPr id="36" name="Group 35"/>
+              <p:cNvGrpSpPr/>
+              <p:nvPr/>
+            </p:nvGrpSpPr>
+            <p:grpSpPr>
+              <a:xfrm>
+                <a:off x="198783" y="182880"/>
+                <a:ext cx="508634" cy="601344"/>
+                <a:chOff x="0" y="0"/>
+                <a:chExt cx="509049" cy="601760"/>
+              </a:xfrm>
+            </p:grpSpPr>
+            <p:cxnSp>
+              <p:nvCxnSpPr>
+                <p:cNvPr id="38" name="Straight Arrow Connector 37"/>
+                <p:cNvCxnSpPr/>
+                <p:nvPr/>
+              </p:nvCxnSpPr>
+              <p:spPr>
+                <a:xfrm flipV="1">
+                  <a:off x="0" y="159027"/>
+                  <a:ext cx="469127" cy="266121"/>
+                </a:xfrm>
+                <a:prstGeom prst="straightConnector1">
+                  <a:avLst/>
+                </a:prstGeom>
+                <a:ln w="19050">
+                  <a:solidFill>
+                    <a:schemeClr val="tx1"/>
+                  </a:solidFill>
+                  <a:tailEnd type="arrow"/>
+                </a:ln>
+              </p:spPr>
+              <p:style>
+                <a:lnRef idx="1">
+                  <a:schemeClr val="accent1"/>
+                </a:lnRef>
+                <a:fillRef idx="0">
+                  <a:schemeClr val="accent1"/>
+                </a:fillRef>
+                <a:effectRef idx="0">
+                  <a:schemeClr val="accent1"/>
+                </a:effectRef>
+                <a:fontRef idx="minor">
+                  <a:schemeClr val="tx1"/>
+                </a:fontRef>
+              </p:style>
+            </p:cxnSp>
+            <p:cxnSp>
+              <p:nvCxnSpPr>
+                <p:cNvPr id="39" name="Straight Arrow Connector 38"/>
+                <p:cNvCxnSpPr/>
+                <p:nvPr/>
+              </p:nvCxnSpPr>
+              <p:spPr>
+                <a:xfrm>
+                  <a:off x="0" y="421420"/>
+                  <a:ext cx="509049" cy="180340"/>
+                </a:xfrm>
+                <a:prstGeom prst="straightConnector1">
+                  <a:avLst/>
+                </a:prstGeom>
+                <a:ln w="19050">
+                  <a:solidFill>
+                    <a:schemeClr val="tx1"/>
+                  </a:solidFill>
+                  <a:tailEnd type="arrow"/>
+                </a:ln>
+              </p:spPr>
+              <p:style>
+                <a:lnRef idx="1">
+                  <a:schemeClr val="accent1"/>
+                </a:lnRef>
+                <a:fillRef idx="0">
+                  <a:schemeClr val="accent1"/>
+                </a:fillRef>
+                <a:effectRef idx="0">
+                  <a:schemeClr val="accent1"/>
+                </a:effectRef>
+                <a:fontRef idx="minor">
+                  <a:schemeClr val="tx1"/>
+                </a:fontRef>
+              </p:style>
+            </p:cxnSp>
+            <p:cxnSp>
+              <p:nvCxnSpPr>
+                <p:cNvPr id="40" name="Straight Arrow Connector 39"/>
+                <p:cNvCxnSpPr/>
+                <p:nvPr/>
+              </p:nvCxnSpPr>
+              <p:spPr>
+                <a:xfrm flipV="1">
+                  <a:off x="0" y="0"/>
+                  <a:ext cx="0" cy="422206"/>
+                </a:xfrm>
+                <a:prstGeom prst="straightConnector1">
+                  <a:avLst/>
+                </a:prstGeom>
+                <a:ln w="19050">
+                  <a:solidFill>
+                    <a:schemeClr val="tx1"/>
+                  </a:solidFill>
+                  <a:tailEnd type="arrow"/>
+                </a:ln>
+              </p:spPr>
+              <p:style>
+                <a:lnRef idx="1">
+                  <a:schemeClr val="accent1"/>
+                </a:lnRef>
+                <a:fillRef idx="0">
+                  <a:schemeClr val="accent1"/>
+                </a:fillRef>
+                <a:effectRef idx="0">
+                  <a:schemeClr val="accent1"/>
+                </a:effectRef>
+                <a:fontRef idx="minor">
+                  <a:schemeClr val="tx1"/>
+                </a:fontRef>
+              </p:style>
+            </p:cxnSp>
+          </p:grpSp>
+          <p:sp>
+            <p:nvSpPr>
+              <p:cNvPr id="37" name="Text Box 498"/>
+              <p:cNvSpPr txBox="1"/>
+              <p:nvPr/>
+            </p:nvSpPr>
+            <p:spPr>
+              <a:xfrm>
+                <a:off x="0" y="0"/>
+                <a:ext cx="706755" cy="180340"/>
+              </a:xfrm>
+              <a:prstGeom prst="rect">
+                <a:avLst/>
+              </a:prstGeom>
+              <a:noFill/>
+              <a:ln w="6350">
+                <a:noFill/>
+              </a:ln>
+              <a:effectLst/>
+            </p:spPr>
+            <p:style>
+              <a:lnRef idx="0">
+                <a:schemeClr val="accent1"/>
+              </a:lnRef>
+              <a:fillRef idx="0">
+                <a:schemeClr val="accent1"/>
+              </a:fillRef>
+              <a:effectRef idx="0">
+                <a:schemeClr val="accent1"/>
+              </a:effectRef>
+              <a:fontRef idx="minor">
+                <a:schemeClr val="dk1"/>
+              </a:fontRef>
+            </p:style>
+            <p:txBody>
+              <a:bodyPr rot="0" spcFirstLastPara="0" vert="horz" wrap="square" lIns="0" tIns="0" rIns="0" bIns="0" numCol="1" spcCol="0" rtlCol="0" fromWordArt="0" anchor="t" anchorCtr="0" forceAA="0" compatLnSpc="1">
+                <a:prstTxWarp prst="textNoShape">
+                  <a:avLst/>
+                </a:prstTxWarp>
+                <a:noAutofit/>
+              </a:bodyPr>
+              <a:lstStyle/>
+              <a:p>
+                <a:pPr>
+                  <a:spcAft>
+                    <a:spcPts val="0"/>
+                  </a:spcAft>
+                </a:pPr>
+                <a:r>
+                  <a:rPr lang="en-GB" sz="1200">
+                    <a:effectLst/>
+                    <a:latin typeface="Times New Roman" panose="02020603050405020304" pitchFamily="18" charset="0"/>
+                    <a:ea typeface="Calibri" panose="020F0502020204030204" pitchFamily="34" charset="0"/>
+                  </a:rPr>
+                  <a:t>Layers (z)</a:t>
+                </a:r>
+              </a:p>
+            </p:txBody>
+          </p:sp>
+        </p:grpSp>
+      </p:grpSp>
+      <p:sp>
+        <p:nvSpPr>
+          <p:cNvPr id="42" name="TextBox 41"/>
+          <p:cNvSpPr txBox="1"/>
+          <p:nvPr/>
+        </p:nvSpPr>
+        <p:spPr>
+          <a:xfrm>
+            <a:off x="266700" y="1028700"/>
+            <a:ext cx="8362950" cy="461665"/>
+          </a:xfrm>
+          <a:prstGeom prst="rect">
+            <a:avLst/>
+          </a:prstGeom>
+          <a:noFill/>
+        </p:spPr>
+        <p:txBody>
+          <a:bodyPr wrap="square" rtlCol="0">
+            <a:spAutoFit/>
+          </a:bodyPr>
+          <a:lstStyle/>
+          <a:p>
+            <a:r>
+              <a:rPr lang="en-GB" sz="2400" dirty="0" smtClean="0">
+                <a:latin typeface="+mj-lt"/>
+              </a:rPr>
+              <a:t>These all use the CTextile3DWeave base class</a:t>
+            </a:r>
+            <a:endParaRPr lang="en-GB" sz="2400" dirty="0" smtClean="0">
+              <a:latin typeface="+mj-lt"/>
+            </a:endParaRPr>
+          </a:p>
+        </p:txBody>
+      </p:sp>
+      <p:sp>
+        <p:nvSpPr>
+          <p:cNvPr id="43" name="TextBox 42"/>
+          <p:cNvSpPr txBox="1"/>
+          <p:nvPr/>
+        </p:nvSpPr>
+        <p:spPr>
+          <a:xfrm>
+            <a:off x="266700" y="1885950"/>
+            <a:ext cx="3695149" cy="4708981"/>
+          </a:xfrm>
+          <a:prstGeom prst="rect">
+            <a:avLst/>
+          </a:prstGeom>
+          <a:noFill/>
+        </p:spPr>
+        <p:txBody>
+          <a:bodyPr wrap="square" rtlCol="0">
+            <a:spAutoFit/>
+          </a:bodyPr>
+          <a:lstStyle/>
+          <a:p>
+            <a:pPr marL="342900" indent="-342900">
+              <a:buFont typeface="Arial" panose="020B0604020202020204" pitchFamily="34" charset="0"/>
+              <a:buChar char="•"/>
+            </a:pPr>
+            <a:r>
+              <a:rPr lang="en-GB" sz="2000" dirty="0" smtClean="0">
+                <a:latin typeface="Calibri" panose="020F0502020204030204" pitchFamily="34" charset="0"/>
+              </a:rPr>
+              <a:t>Creates a grid of points at the yarn crossovers, specified in the GUI by the Weave Pattern dialog</a:t>
+            </a:r>
+          </a:p>
+          <a:p>
+            <a:endParaRPr lang="en-GB" sz="2000" dirty="0" smtClean="0">
+              <a:latin typeface="Calibri" panose="020F0502020204030204" pitchFamily="34" charset="0"/>
+            </a:endParaRPr>
+          </a:p>
+          <a:p>
+            <a:pPr marL="342900" indent="-342900">
+              <a:buFont typeface="Arial" panose="020B0604020202020204" pitchFamily="34" charset="0"/>
+              <a:buChar char="•"/>
+            </a:pPr>
+            <a:r>
+              <a:rPr lang="en-GB" sz="2000" dirty="0" smtClean="0">
+                <a:latin typeface="Calibri" panose="020F0502020204030204" pitchFamily="34" charset="0"/>
+              </a:rPr>
+              <a:t>Each point may be warp, weft or no yarn</a:t>
+            </a:r>
+          </a:p>
+          <a:p>
+            <a:endParaRPr lang="en-GB" sz="2000" dirty="0" smtClean="0">
+              <a:latin typeface="Calibri" panose="020F0502020204030204" pitchFamily="34" charset="0"/>
+            </a:endParaRPr>
+          </a:p>
+          <a:p>
+            <a:pPr marL="342900" indent="-342900">
+              <a:buFont typeface="Arial" panose="020B0604020202020204" pitchFamily="34" charset="0"/>
+              <a:buChar char="•"/>
+            </a:pPr>
+            <a:r>
+              <a:rPr lang="en-GB" sz="2000" dirty="0" smtClean="0">
+                <a:latin typeface="Calibri" panose="020F0502020204030204" pitchFamily="34" charset="0"/>
+              </a:rPr>
+              <a:t>The derived classes then automatically generate the yarn paths from this </a:t>
+            </a:r>
+            <a:r>
+              <a:rPr lang="en-GB" sz="2000" dirty="0" err="1" smtClean="0">
+                <a:latin typeface="Calibri" panose="020F0502020204030204" pitchFamily="34" charset="0"/>
+              </a:rPr>
+              <a:t>dat</a:t>
+            </a:r>
+            <a:endParaRPr lang="en-GB" sz="2000" dirty="0" smtClean="0">
+              <a:latin typeface="Calibri" panose="020F0502020204030204" pitchFamily="34" charset="0"/>
+            </a:endParaRPr>
+          </a:p>
+          <a:p>
+            <a:endParaRPr lang="en-GB" sz="2000" dirty="0" smtClean="0">
+              <a:latin typeface="Calibri" panose="020F0502020204030204" pitchFamily="34" charset="0"/>
+            </a:endParaRPr>
+          </a:p>
+          <a:p>
+            <a:pPr marL="342900" indent="-342900">
+              <a:buFont typeface="Arial" panose="020B0604020202020204" pitchFamily="34" charset="0"/>
+              <a:buChar char="•"/>
+            </a:pPr>
+            <a:r>
+              <a:rPr lang="en-GB" sz="2000" dirty="0" smtClean="0">
+                <a:latin typeface="Calibri" panose="020F0502020204030204" pitchFamily="34" charset="0"/>
+              </a:rPr>
+              <a:t>Textiles using th</a:t>
+            </a:r>
+            <a:r>
+              <a:rPr lang="en-GB" sz="2000" dirty="0" smtClean="0">
+                <a:latin typeface="Calibri" panose="020F0502020204030204" pitchFamily="34" charset="0"/>
+              </a:rPr>
+              <a:t>e base class can be created using a Python script</a:t>
+            </a:r>
+            <a:endParaRPr lang="en-GB" sz="2000" dirty="0" smtClean="0">
+              <a:latin typeface="Calibri" panose="020F0502020204030204" pitchFamily="34" charset="0"/>
+            </a:endParaRPr>
+          </a:p>
+        </p:txBody>
+      </p:sp>
+    </p:spTree>
+    <p:extLst>
+      <p:ext uri="{BB962C8B-B14F-4D97-AF65-F5344CB8AC3E}">
+        <p14:creationId xmlns:p14="http://schemas.microsoft.com/office/powerpoint/2010/main" val="3219311688"/>
+      </p:ext>
+    </p:extLst>
+  </p:cSld>
+  <p:clrMapOvr>
+    <a:masterClrMapping/>
+  </p:clrMapOvr>
+  <mc:AlternateContent xmlns:mc="http://schemas.openxmlformats.org/markup-compatibility/2006" xmlns:p14="http://schemas.microsoft.com/office/powerpoint/2010/main">
+    <mc:Choice Requires="p14">
+      <p:transition spd="med" p14:dur="700">
+        <p:fade/>
+      </p:transition>
+    </mc:Choice>
+    <mc:Fallback xmlns="">
+      <p:transition spd="med">
+        <p:fade/>
+      </p:transition>
+    </mc:Fallback>
+  </mc:AlternateContent>
+  <p:timing>
+    <p:tnLst>
+      <p:par>
+        <p:cTn id="1" dur="indefinite" restart="never" nodeType="tmRoot"/>
+      </p:par>
+    </p:tnLst>
+  </p:timing>
+</p:sld>
+</file>
+
+<file path=ppt/slides/slide21.xml><?xml version="1.0" encoding="utf-8"?>
+<p:sld xmlns:a="http://schemas.openxmlformats.org/drawingml/2006/main" xmlns:r="http://schemas.openxmlformats.org/officeDocument/2006/relationships" xmlns:p="http://schemas.openxmlformats.org/presentationml/2006/main">
+  <p:cSld>
+    <p:spTree>
+      <p:nvGrpSpPr>
+        <p:cNvPr id="1" name=""/>
+        <p:cNvGrpSpPr/>
+        <p:nvPr/>
+      </p:nvGrpSpPr>
+      <p:grpSpPr>
+        <a:xfrm>
+          <a:off x="0" y="0"/>
+          <a:ext cx="0" cy="0"/>
+          <a:chOff x="0" y="0"/>
+          <a:chExt cx="0" cy="0"/>
+        </a:xfrm>
+      </p:grpSpPr>
+      <p:sp>
+        <p:nvSpPr>
+          <p:cNvPr id="2" name="Title 1"/>
+          <p:cNvSpPr>
+            <a:spLocks noGrp="1"/>
+          </p:cNvSpPr>
+          <p:nvPr>
+            <p:ph type="title"/>
+          </p:nvPr>
+        </p:nvSpPr>
+        <p:spPr/>
+        <p:txBody>
+          <a:bodyPr/>
+          <a:lstStyle/>
+          <a:p>
+            <a:r>
+              <a:rPr lang="en-GB" dirty="0" smtClean="0"/>
+              <a:t>Resources</a:t>
+            </a:r>
+            <a:endParaRPr lang="en-GB" dirty="0"/>
+          </a:p>
+        </p:txBody>
+      </p:sp>
+      <p:sp>
+        <p:nvSpPr>
+          <p:cNvPr id="3" name="TextBox 2"/>
+          <p:cNvSpPr txBox="1"/>
+          <p:nvPr/>
+        </p:nvSpPr>
+        <p:spPr>
+          <a:xfrm>
+            <a:off x="933449" y="1304925"/>
+            <a:ext cx="7705725" cy="4524315"/>
+          </a:xfrm>
+          <a:prstGeom prst="rect">
+            <a:avLst/>
+          </a:prstGeom>
+          <a:noFill/>
+        </p:spPr>
+        <p:txBody>
+          <a:bodyPr wrap="square" rtlCol="0">
+            <a:spAutoFit/>
+          </a:bodyPr>
+          <a:lstStyle/>
+          <a:p>
+            <a:r>
+              <a:rPr lang="en-GB" sz="2400" dirty="0" smtClean="0">
+                <a:latin typeface="+mj-lt"/>
+              </a:rPr>
+              <a:t>User Guide: </a:t>
+            </a:r>
+            <a:r>
+              <a:rPr lang="en-GB" sz="2400" dirty="0" smtClean="0">
+                <a:latin typeface="+mj-lt"/>
+                <a:hlinkClick r:id="rId2"/>
+              </a:rPr>
+              <a:t>http://texgen.sourceforge.net/index.php/User_Guide</a:t>
+            </a:r>
+            <a:endParaRPr lang="en-GB" sz="2400" dirty="0" smtClean="0">
+              <a:latin typeface="+mj-lt"/>
+            </a:endParaRPr>
+          </a:p>
+          <a:p>
+            <a:endParaRPr lang="en-GB" sz="2400" dirty="0">
+              <a:latin typeface="+mj-lt"/>
+            </a:endParaRPr>
+          </a:p>
+          <a:p>
+            <a:r>
+              <a:rPr lang="en-GB" sz="2400" dirty="0" smtClean="0">
+                <a:latin typeface="+mj-lt"/>
+              </a:rPr>
+              <a:t>Scripting Guide:</a:t>
+            </a:r>
+          </a:p>
+          <a:p>
+            <a:r>
+              <a:rPr lang="en-GB" sz="2400" dirty="0">
+                <a:latin typeface="+mj-lt"/>
+                <a:hlinkClick r:id="rId3"/>
+              </a:rPr>
+              <a:t>https://</a:t>
+            </a:r>
+            <a:r>
+              <a:rPr lang="en-GB" sz="2400" dirty="0" smtClean="0">
+                <a:latin typeface="+mj-lt"/>
+                <a:hlinkClick r:id="rId3"/>
+              </a:rPr>
+              <a:t>github.com/louisepb/TexGenScriptingGuide</a:t>
+            </a:r>
+            <a:endParaRPr lang="en-GB" sz="2400" dirty="0" smtClean="0">
+              <a:latin typeface="+mj-lt"/>
+            </a:endParaRPr>
+          </a:p>
+          <a:p>
+            <a:endParaRPr lang="en-GB" sz="2400" dirty="0">
+              <a:latin typeface="+mj-lt"/>
+            </a:endParaRPr>
+          </a:p>
+          <a:p>
+            <a:r>
+              <a:rPr lang="en-GB" sz="2400" dirty="0" err="1" smtClean="0">
+                <a:latin typeface="+mj-lt"/>
+              </a:rPr>
+              <a:t>TexGen</a:t>
+            </a:r>
+            <a:r>
+              <a:rPr lang="en-GB" sz="2400" dirty="0" smtClean="0">
+                <a:latin typeface="+mj-lt"/>
+              </a:rPr>
+              <a:t> source code:</a:t>
+            </a:r>
+          </a:p>
+          <a:p>
+            <a:r>
+              <a:rPr lang="en-GB" sz="2400" dirty="0">
+                <a:latin typeface="+mj-lt"/>
+                <a:hlinkClick r:id="rId4"/>
+              </a:rPr>
+              <a:t>https://</a:t>
+            </a:r>
+            <a:r>
+              <a:rPr lang="en-GB" sz="2400" dirty="0" smtClean="0">
+                <a:latin typeface="+mj-lt"/>
+                <a:hlinkClick r:id="rId4"/>
+              </a:rPr>
+              <a:t>github.com/louisepb/TexGen</a:t>
+            </a:r>
+            <a:endParaRPr lang="en-GB" sz="2400" dirty="0" smtClean="0">
+              <a:latin typeface="+mj-lt"/>
+            </a:endParaRPr>
+          </a:p>
+          <a:p>
+            <a:endParaRPr lang="en-GB" sz="2400" dirty="0">
+              <a:latin typeface="+mj-lt"/>
+            </a:endParaRPr>
+          </a:p>
+          <a:p>
+            <a:r>
+              <a:rPr lang="en-GB" sz="2400" dirty="0" smtClean="0">
+                <a:latin typeface="+mj-lt"/>
+              </a:rPr>
+              <a:t>Workshop materials:</a:t>
+            </a:r>
+          </a:p>
+          <a:p>
+            <a:r>
+              <a:rPr lang="en-GB" sz="2400" dirty="0">
+                <a:latin typeface="+mj-lt"/>
+                <a:hlinkClick r:id="rId5"/>
+              </a:rPr>
+              <a:t>https://</a:t>
+            </a:r>
+            <a:r>
+              <a:rPr lang="en-GB" sz="2400" dirty="0" smtClean="0">
+                <a:latin typeface="+mj-lt"/>
+                <a:hlinkClick r:id="rId5"/>
+              </a:rPr>
+              <a:t>github.com/louisepb/ICMAC2018-Workshop</a:t>
+            </a:r>
+            <a:endParaRPr lang="en-GB" sz="2400" dirty="0" smtClean="0">
+              <a:latin typeface="+mj-lt"/>
+            </a:endParaRPr>
+          </a:p>
+          <a:p>
+            <a:endParaRPr lang="en-GB" sz="2400" dirty="0" smtClean="0">
+              <a:latin typeface="+mj-lt"/>
+            </a:endParaRPr>
+          </a:p>
+        </p:txBody>
+      </p:sp>
+    </p:spTree>
+    <p:extLst>
+      <p:ext uri="{BB962C8B-B14F-4D97-AF65-F5344CB8AC3E}">
+        <p14:creationId xmlns:p14="http://schemas.microsoft.com/office/powerpoint/2010/main" val="1643070881"/>
+      </p:ext>
+    </p:extLst>
+  </p:cSld>
+  <p:clrMapOvr>
+    <a:masterClrMapping/>
+  </p:clrMapOvr>
+  <mc:AlternateContent xmlns:mc="http://schemas.openxmlformats.org/markup-compatibility/2006" xmlns:p14="http://schemas.microsoft.com/office/powerpoint/2010/main">
+    <mc:Choice Requires="p14">
+      <p:transition spd="med" p14:dur="700">
+        <p:fade/>
+      </p:transition>
+    </mc:Choice>
+    <mc:Fallback xmlns="">
+      <p:transition spd="med">
+        <p:fade/>
+      </p:transition>
+    </mc:Fallback>
+  </mc:AlternateContent>
+  <p:timing>
+    <p:tnLst>
+      <p:par>
+        <p:cTn id="1" dur="indefinite" restart="never" nodeType="tmRoot"/>
+      </p:par>
+    </p:tnLst>
+  </p:timing>
 </p:sld>
 </file>
 
@@ -9260,6 +11783,13 @@
       </p:transition>
     </mc:Fallback>
   </mc:AlternateContent>
+  <p:timing>
+    <p:tnLst>
+      <p:par>
+        <p:cTn id="1" dur="indefinite" restart="never" nodeType="tmRoot"/>
+      </p:par>
+    </p:tnLst>
+  </p:timing>
 </p:sld>
 </file>
 
@@ -11033,6 +13563,13 @@
       </p:transition>
     </mc:Fallback>
   </mc:AlternateContent>
+  <p:timing>
+    <p:tnLst>
+      <p:par>
+        <p:cTn id="1" dur="indefinite" restart="never" nodeType="tmRoot"/>
+      </p:par>
+    </p:tnLst>
+  </p:timing>
 </p:sld>
 </file>
 
@@ -11284,6 +13821,13 @@
       </p:transition>
     </mc:Fallback>
   </mc:AlternateContent>
+  <p:timing>
+    <p:tnLst>
+      <p:par>
+        <p:cTn id="1" dur="indefinite" restart="never" nodeType="tmRoot"/>
+      </p:par>
+    </p:tnLst>
+  </p:timing>
 </p:sld>
 </file>
 
@@ -11694,6 +14238,13 @@
       </p:transition>
     </mc:Fallback>
   </mc:AlternateContent>
+  <p:timing>
+    <p:tnLst>
+      <p:par>
+        <p:cTn id="1" dur="indefinite" restart="never" nodeType="tmRoot"/>
+      </p:par>
+    </p:tnLst>
+  </p:timing>
 </p:sld>
 </file>
 

</xml_diff>

<commit_message>
Added script for example in slides
</commit_message>
<xml_diff>
--- a/ICMAC TexGen workshop 2018.pptx
+++ b/ICMAC TexGen workshop 2018.pptx
@@ -3831,6 +3831,13 @@
       </p:transition>
     </mc:Fallback>
   </mc:AlternateContent>
+  <p:timing>
+    <p:tnLst>
+      <p:par>
+        <p:cTn id="1" dur="indefinite" restart="never" nodeType="tmRoot"/>
+      </p:par>
+    </p:tnLst>
+  </p:timing>
 </p:sld>
 </file>
 
@@ -3946,7 +3953,7 @@
         <p:spPr>
           <a:xfrm>
             <a:off x="504775" y="1563201"/>
-            <a:ext cx="8134450" cy="2800767"/>
+            <a:ext cx="8134450" cy="2554545"/>
           </a:xfrm>
           <a:prstGeom prst="rect">
             <a:avLst/>
@@ -4176,25 +4183,16 @@
                 <a:latin typeface="Courier New" panose="02070309020205020404" pitchFamily="49" charset="0"/>
                 <a:cs typeface="Courier New" panose="02070309020205020404" pitchFamily="49" charset="0"/>
               </a:rPr>
-              <a:t> )</a:t>
-            </a:r>
-          </a:p>
-          <a:p>
-            <a:r>
-              <a:rPr lang="en-GB" sz="1600" dirty="0" err="1" smtClean="0">
-                <a:latin typeface="Courier New" panose="02070309020205020404" pitchFamily="49" charset="0"/>
-                <a:cs typeface="Courier New" panose="02070309020205020404" pitchFamily="49" charset="0"/>
-              </a:rPr>
-              <a:t>Textile.AddYarn</a:t>
+              <a:t> </a:t>
             </a:r>
             <a:r>
               <a:rPr lang="en-GB" sz="1600" dirty="0" smtClean="0">
                 <a:latin typeface="Courier New" panose="02070309020205020404" pitchFamily="49" charset="0"/>
                 <a:cs typeface="Courier New" panose="02070309020205020404" pitchFamily="49" charset="0"/>
               </a:rPr>
-              <a:t>(Yarn)</a:t>
-            </a:r>
-            <a:endParaRPr lang="en-GB" sz="1600" dirty="0">
+              <a:t>)</a:t>
+            </a:r>
+            <a:endParaRPr lang="en-GB" sz="1600" dirty="0" smtClean="0">
               <a:latin typeface="Courier New" panose="02070309020205020404" pitchFamily="49" charset="0"/>
               <a:cs typeface="Courier New" panose="02070309020205020404" pitchFamily="49" charset="0"/>
             </a:endParaRPr>
@@ -4254,6 +4252,13 @@
       </p:transition>
     </mc:Fallback>
   </mc:AlternateContent>
+  <p:timing>
+    <p:tnLst>
+      <p:par>
+        <p:cTn id="1" dur="indefinite" restart="never" nodeType="tmRoot"/>
+      </p:par>
+    </p:tnLst>
+  </p:timing>
 </p:sld>
 </file>
 
@@ -4479,7 +4484,7 @@
         <p:spPr>
           <a:xfrm>
             <a:off x="323849" y="4793585"/>
-            <a:ext cx="5191125" cy="769441"/>
+            <a:ext cx="5191125" cy="1384995"/>
           </a:xfrm>
           <a:prstGeom prst="rect">
             <a:avLst/>
@@ -4539,6 +4544,35 @@
                 <a:cs typeface="Courier New" panose="02070309020205020404" pitchFamily="49" charset="0"/>
               </a:rPr>
               <a:t>))</a:t>
+            </a:r>
+          </a:p>
+          <a:p>
+            <a:endParaRPr lang="en-GB" sz="2000" dirty="0">
+              <a:latin typeface="Courier New" panose="02070309020205020404" pitchFamily="49" charset="0"/>
+              <a:cs typeface="Courier New" panose="02070309020205020404" pitchFamily="49" charset="0"/>
+            </a:endParaRPr>
+          </a:p>
+          <a:p>
+            <a:r>
+              <a:rPr lang="en-GB" sz="2000" dirty="0" err="1">
+                <a:latin typeface="Courier New" panose="02070309020205020404" pitchFamily="49" charset="0"/>
+                <a:cs typeface="Courier New" panose="02070309020205020404" pitchFamily="49" charset="0"/>
+              </a:rPr>
+              <a:t>Textile.AddYarn</a:t>
+            </a:r>
+            <a:r>
+              <a:rPr lang="en-GB" sz="2000" dirty="0">
+                <a:latin typeface="Courier New" panose="02070309020205020404" pitchFamily="49" charset="0"/>
+                <a:cs typeface="Courier New" panose="02070309020205020404" pitchFamily="49" charset="0"/>
+              </a:rPr>
+              <a:t>(Yarn</a:t>
+            </a:r>
+            <a:r>
+              <a:rPr lang="en-GB" sz="2000" dirty="0" smtClean="0">
+                <a:latin typeface="Courier New" panose="02070309020205020404" pitchFamily="49" charset="0"/>
+                <a:cs typeface="Courier New" panose="02070309020205020404" pitchFamily="49" charset="0"/>
+              </a:rPr>
+              <a:t>)</a:t>
             </a:r>
             <a:endParaRPr lang="en-GB" sz="2000" dirty="0">
               <a:latin typeface="Courier New" panose="02070309020205020404" pitchFamily="49" charset="0"/>
@@ -4569,6 +4603,13 @@
       </p:transition>
     </mc:Fallback>
   </mc:AlternateContent>
+  <p:timing>
+    <p:tnLst>
+      <p:par>
+        <p:cTn id="1" dur="indefinite" restart="never" nodeType="tmRoot"/>
+      </p:par>
+    </p:tnLst>
+  </p:timing>
 </p:sld>
 </file>
 
@@ -7430,9 +7471,6 @@
               </a:rPr>
               <a:t> slower</a:t>
             </a:r>
-            <a:endParaRPr lang="en-GB" sz="2000" dirty="0" smtClean="0">
-              <a:latin typeface="Calibri" panose="020F0502020204030204" pitchFamily="34" charset="0"/>
-            </a:endParaRPr>
           </a:p>
         </p:txBody>
       </p:sp>
@@ -7539,9 +7577,6 @@
               </a:rPr>
               <a:t> format</a:t>
             </a:r>
-            <a:endParaRPr lang="en-GB" sz="2000" dirty="0" smtClean="0">
-              <a:latin typeface="Calibri" panose="020F0502020204030204" pitchFamily="34" charset="0"/>
-            </a:endParaRPr>
           </a:p>
         </p:txBody>
       </p:sp>
@@ -10627,9 +10662,6 @@
               </a:rPr>
               <a:t>These all use the CTextile3DWeave base class</a:t>
             </a:r>
-            <a:endParaRPr lang="en-GB" sz="2400" dirty="0" smtClean="0">
-              <a:latin typeface="+mj-lt"/>
-            </a:endParaRPr>
           </a:p>
         </p:txBody>
       </p:sp>
@@ -10723,17 +10755,8 @@
               <a:rPr lang="en-GB" sz="2000" dirty="0" smtClean="0">
                 <a:latin typeface="Calibri" panose="020F0502020204030204" pitchFamily="34" charset="0"/>
               </a:rPr>
-              <a:t>Textiles using th</a:t>
-            </a:r>
-            <a:r>
-              <a:rPr lang="en-GB" sz="2000" dirty="0" smtClean="0">
-                <a:latin typeface="Calibri" panose="020F0502020204030204" pitchFamily="34" charset="0"/>
-              </a:rPr>
-              <a:t>e base class can be created using a Python script</a:t>
-            </a:r>
-            <a:endParaRPr lang="en-GB" sz="2000" dirty="0" smtClean="0">
-              <a:latin typeface="Calibri" panose="020F0502020204030204" pitchFamily="34" charset="0"/>
-            </a:endParaRPr>
+              <a:t>Textiles using the base class can be created using a Python script</a:t>
+            </a:r>
           </a:p>
         </p:txBody>
       </p:sp>
@@ -14796,6 +14819,13 @@
       </p:transition>
     </mc:Fallback>
   </mc:AlternateContent>
+  <p:timing>
+    <p:tnLst>
+      <p:par>
+        <p:cTn id="1" dur="indefinite" restart="never" nodeType="tmRoot"/>
+      </p:par>
+    </p:tnLst>
+  </p:timing>
 </p:sld>
 </file>
 
@@ -15096,6 +15126,13 @@
       </p:transition>
     </mc:Fallback>
   </mc:AlternateContent>
+  <p:timing>
+    <p:tnLst>
+      <p:par>
+        <p:cTn id="1" dur="indefinite" restart="never" nodeType="tmRoot"/>
+      </p:par>
+    </p:tnLst>
+  </p:timing>
 </p:sld>
 </file>
 

</xml_diff>